<commit_message>
remove bad repsuc data
</commit_message>
<xml_diff>
--- a/Output_local/holding/figs/Figs_1.13.23.pptx
+++ b/Output_local/holding/figs/Figs_1.13.23.pptx
@@ -19,14 +19,18 @@
     <p:sldId id="269" r:id="rId13"/>
     <p:sldId id="264" r:id="rId14"/>
     <p:sldId id="265" r:id="rId15"/>
-    <p:sldId id="266" r:id="rId16"/>
-    <p:sldId id="271" r:id="rId17"/>
-    <p:sldId id="272" r:id="rId18"/>
-    <p:sldId id="273" r:id="rId19"/>
-    <p:sldId id="275" r:id="rId20"/>
-    <p:sldId id="276" r:id="rId21"/>
-    <p:sldId id="277" r:id="rId22"/>
-    <p:sldId id="278" r:id="rId23"/>
+    <p:sldId id="279" r:id="rId16"/>
+    <p:sldId id="266" r:id="rId17"/>
+    <p:sldId id="280" r:id="rId18"/>
+    <p:sldId id="271" r:id="rId19"/>
+    <p:sldId id="272" r:id="rId20"/>
+    <p:sldId id="273" r:id="rId21"/>
+    <p:sldId id="281" r:id="rId22"/>
+    <p:sldId id="282" r:id="rId23"/>
+    <p:sldId id="275" r:id="rId24"/>
+    <p:sldId id="276" r:id="rId25"/>
+    <p:sldId id="277" r:id="rId26"/>
+    <p:sldId id="278" r:id="rId27"/>
   </p:sldIdLst>
   <p:sldSz cx="12192000" cy="6858000"/>
   <p:notesSz cx="6858000" cy="9144000"/>
@@ -326,7 +330,7 @@
           <a:p>
             <a:fld id="{7A4046AA-27C9-44E6-A581-156BA02D08E8}" type="datetimeFigureOut">
               <a:rPr lang="en-US" smtClean="0"/>
-              <a:t>1/17/2023</a:t>
+              <a:t>1/27/2023</a:t>
             </a:fld>
             <a:endParaRPr lang="en-US"/>
           </a:p>
@@ -524,7 +528,7 @@
           <a:p>
             <a:fld id="{7A4046AA-27C9-44E6-A581-156BA02D08E8}" type="datetimeFigureOut">
               <a:rPr lang="en-US" smtClean="0"/>
-              <a:t>1/17/2023</a:t>
+              <a:t>1/27/2023</a:t>
             </a:fld>
             <a:endParaRPr lang="en-US"/>
           </a:p>
@@ -732,7 +736,7 @@
           <a:p>
             <a:fld id="{7A4046AA-27C9-44E6-A581-156BA02D08E8}" type="datetimeFigureOut">
               <a:rPr lang="en-US" smtClean="0"/>
-              <a:t>1/17/2023</a:t>
+              <a:t>1/27/2023</a:t>
             </a:fld>
             <a:endParaRPr lang="en-US"/>
           </a:p>
@@ -930,7 +934,7 @@
           <a:p>
             <a:fld id="{7A4046AA-27C9-44E6-A581-156BA02D08E8}" type="datetimeFigureOut">
               <a:rPr lang="en-US" smtClean="0"/>
-              <a:t>1/17/2023</a:t>
+              <a:t>1/27/2023</a:t>
             </a:fld>
             <a:endParaRPr lang="en-US"/>
           </a:p>
@@ -1205,7 +1209,7 @@
           <a:p>
             <a:fld id="{7A4046AA-27C9-44E6-A581-156BA02D08E8}" type="datetimeFigureOut">
               <a:rPr lang="en-US" smtClean="0"/>
-              <a:t>1/17/2023</a:t>
+              <a:t>1/27/2023</a:t>
             </a:fld>
             <a:endParaRPr lang="en-US"/>
           </a:p>
@@ -1470,7 +1474,7 @@
           <a:p>
             <a:fld id="{7A4046AA-27C9-44E6-A581-156BA02D08E8}" type="datetimeFigureOut">
               <a:rPr lang="en-US" smtClean="0"/>
-              <a:t>1/17/2023</a:t>
+              <a:t>1/27/2023</a:t>
             </a:fld>
             <a:endParaRPr lang="en-US"/>
           </a:p>
@@ -1882,7 +1886,7 @@
           <a:p>
             <a:fld id="{7A4046AA-27C9-44E6-A581-156BA02D08E8}" type="datetimeFigureOut">
               <a:rPr lang="en-US" smtClean="0"/>
-              <a:t>1/17/2023</a:t>
+              <a:t>1/27/2023</a:t>
             </a:fld>
             <a:endParaRPr lang="en-US"/>
           </a:p>
@@ -2023,7 +2027,7 @@
           <a:p>
             <a:fld id="{7A4046AA-27C9-44E6-A581-156BA02D08E8}" type="datetimeFigureOut">
               <a:rPr lang="en-US" smtClean="0"/>
-              <a:t>1/17/2023</a:t>
+              <a:t>1/27/2023</a:t>
             </a:fld>
             <a:endParaRPr lang="en-US"/>
           </a:p>
@@ -2136,7 +2140,7 @@
           <a:p>
             <a:fld id="{7A4046AA-27C9-44E6-A581-156BA02D08E8}" type="datetimeFigureOut">
               <a:rPr lang="en-US" smtClean="0"/>
-              <a:t>1/17/2023</a:t>
+              <a:t>1/27/2023</a:t>
             </a:fld>
             <a:endParaRPr lang="en-US"/>
           </a:p>
@@ -2447,7 +2451,7 @@
           <a:p>
             <a:fld id="{7A4046AA-27C9-44E6-A581-156BA02D08E8}" type="datetimeFigureOut">
               <a:rPr lang="en-US" smtClean="0"/>
-              <a:t>1/17/2023</a:t>
+              <a:t>1/27/2023</a:t>
             </a:fld>
             <a:endParaRPr lang="en-US"/>
           </a:p>
@@ -2735,7 +2739,7 @@
           <a:p>
             <a:fld id="{7A4046AA-27C9-44E6-A581-156BA02D08E8}" type="datetimeFigureOut">
               <a:rPr lang="en-US" smtClean="0"/>
-              <a:t>1/17/2023</a:t>
+              <a:t>1/27/2023</a:t>
             </a:fld>
             <a:endParaRPr lang="en-US"/>
           </a:p>
@@ -2976,7 +2980,7 @@
           <a:p>
             <a:fld id="{7A4046AA-27C9-44E6-A581-156BA02D08E8}" type="datetimeFigureOut">
               <a:rPr lang="en-US" smtClean="0"/>
-              <a:t>1/17/2023</a:t>
+              <a:t>1/27/2023</a:t>
             </a:fld>
             <a:endParaRPr lang="en-US"/>
           </a:p>
@@ -5002,6 +5006,485 @@
           <p:cNvPr id="5" name="Picture 4">
             <a:extLst>
               <a:ext uri="{FF2B5EF4-FFF2-40B4-BE49-F238E27FC236}">
+                <a16:creationId xmlns:a16="http://schemas.microsoft.com/office/drawing/2014/main" id="{7924FE77-992E-B12F-4850-4B1EA0ABF6BF}"/>
+              </a:ext>
+            </a:extLst>
+          </p:cNvPr>
+          <p:cNvPicPr>
+            <a:picLocks noChangeAspect="1"/>
+          </p:cNvPicPr>
+          <p:nvPr/>
+        </p:nvPicPr>
+        <p:blipFill>
+          <a:blip r:embed="rId2"/>
+          <a:stretch>
+            <a:fillRect/>
+          </a:stretch>
+        </p:blipFill>
+        <p:spPr>
+          <a:xfrm>
+            <a:off x="144989" y="1520345"/>
+            <a:ext cx="2694826" cy="2603785"/>
+          </a:xfrm>
+          <a:prstGeom prst="rect">
+            <a:avLst/>
+          </a:prstGeom>
+        </p:spPr>
+      </p:pic>
+      <p:sp>
+        <p:nvSpPr>
+          <p:cNvPr id="6" name="TextBox 5">
+            <a:extLst>
+              <a:ext uri="{FF2B5EF4-FFF2-40B4-BE49-F238E27FC236}">
+                <a16:creationId xmlns:a16="http://schemas.microsoft.com/office/drawing/2014/main" id="{0CE1BDE8-4C7A-90A1-2215-8CD366ED3ECD}"/>
+              </a:ext>
+            </a:extLst>
+          </p:cNvPr>
+          <p:cNvSpPr txBox="1"/>
+          <p:nvPr/>
+        </p:nvSpPr>
+        <p:spPr>
+          <a:xfrm>
+            <a:off x="1716494" y="30127"/>
+            <a:ext cx="7929478" cy="369332"/>
+          </a:xfrm>
+          <a:prstGeom prst="rect">
+            <a:avLst/>
+          </a:prstGeom>
+          <a:noFill/>
+        </p:spPr>
+        <p:txBody>
+          <a:bodyPr wrap="none" rtlCol="0">
+            <a:spAutoFit/>
+          </a:bodyPr>
+          <a:lstStyle/>
+          <a:p>
+            <a:r>
+              <a:rPr lang="en-US" dirty="0"/>
+              <a:t>output values among migration rates when simulating a </a:t>
+            </a:r>
+            <a:r>
+              <a:rPr lang="en-US" b="1" u="sng" dirty="0"/>
+              <a:t>critically endangered pop </a:t>
+            </a:r>
+          </a:p>
+        </p:txBody>
+      </p:sp>
+      <p:pic>
+        <p:nvPicPr>
+          <p:cNvPr id="8" name="Picture 7">
+            <a:extLst>
+              <a:ext uri="{FF2B5EF4-FFF2-40B4-BE49-F238E27FC236}">
+                <a16:creationId xmlns:a16="http://schemas.microsoft.com/office/drawing/2014/main" id="{041D0FD1-58EF-0B61-5F20-F55ECA50D0C0}"/>
+              </a:ext>
+            </a:extLst>
+          </p:cNvPr>
+          <p:cNvPicPr>
+            <a:picLocks noChangeAspect="1"/>
+          </p:cNvPicPr>
+          <p:nvPr/>
+        </p:nvPicPr>
+        <p:blipFill>
+          <a:blip r:embed="rId3"/>
+          <a:stretch>
+            <a:fillRect/>
+          </a:stretch>
+        </p:blipFill>
+        <p:spPr>
+          <a:xfrm>
+            <a:off x="2625930" y="3763448"/>
+            <a:ext cx="2804912" cy="2710151"/>
+          </a:xfrm>
+          <a:prstGeom prst="rect">
+            <a:avLst/>
+          </a:prstGeom>
+        </p:spPr>
+      </p:pic>
+      <p:sp>
+        <p:nvSpPr>
+          <p:cNvPr id="9" name="Rectangle 8">
+            <a:extLst>
+              <a:ext uri="{FF2B5EF4-FFF2-40B4-BE49-F238E27FC236}">
+                <a16:creationId xmlns:a16="http://schemas.microsoft.com/office/drawing/2014/main" id="{6B3B4404-7506-D6CB-7843-FA961212585B}"/>
+              </a:ext>
+            </a:extLst>
+          </p:cNvPr>
+          <p:cNvSpPr/>
+          <p:nvPr/>
+        </p:nvSpPr>
+        <p:spPr>
+          <a:xfrm>
+            <a:off x="2917202" y="3563393"/>
+            <a:ext cx="2621039" cy="400110"/>
+          </a:xfrm>
+          <a:prstGeom prst="rect">
+            <a:avLst/>
+          </a:prstGeom>
+          <a:noFill/>
+        </p:spPr>
+        <p:txBody>
+          <a:bodyPr wrap="none" lIns="91440" tIns="45720" rIns="91440" bIns="45720">
+            <a:spAutoFit/>
+          </a:bodyPr>
+          <a:lstStyle/>
+          <a:p>
+            <a:pPr algn="ctr"/>
+            <a:r>
+              <a:rPr lang="en-US" sz="2000" b="0" cap="none" spc="0" dirty="0">
+                <a:ln w="0"/>
+                <a:solidFill>
+                  <a:schemeClr val="tx1"/>
+                </a:solidFill>
+                <a:effectLst>
+                  <a:outerShdw blurRad="38100" dist="19050" dir="2700000" algn="tl" rotWithShape="0">
+                    <a:schemeClr val="dk1">
+                      <a:alpha val="40000"/>
+                    </a:schemeClr>
+                  </a:outerShdw>
+                </a:effectLst>
+              </a:rPr>
+              <a:t>Minor allel</a:t>
+            </a:r>
+            <a:r>
+              <a:rPr lang="en-US" sz="2000" dirty="0">
+                <a:ln w="0"/>
+                <a:effectLst>
+                  <a:outerShdw blurRad="38100" dist="19050" dir="2700000" algn="tl" rotWithShape="0">
+                    <a:schemeClr val="dk1">
+                      <a:alpha val="40000"/>
+                    </a:schemeClr>
+                  </a:outerShdw>
+                </a:effectLst>
+              </a:rPr>
+              <a:t>e </a:t>
+            </a:r>
+            <a:r>
+              <a:rPr lang="en-US" sz="2000" dirty="0" err="1">
+                <a:ln w="0"/>
+                <a:effectLst>
+                  <a:outerShdw blurRad="38100" dist="19050" dir="2700000" algn="tl" rotWithShape="0">
+                    <a:schemeClr val="dk1">
+                      <a:alpha val="40000"/>
+                    </a:schemeClr>
+                  </a:outerShdw>
+                </a:effectLst>
+              </a:rPr>
+              <a:t>freq</a:t>
+            </a:r>
+            <a:r>
+              <a:rPr lang="en-US" sz="2000" dirty="0">
+                <a:ln w="0"/>
+                <a:effectLst>
+                  <a:outerShdw blurRad="38100" dist="19050" dir="2700000" algn="tl" rotWithShape="0">
+                    <a:schemeClr val="dk1">
+                      <a:alpha val="40000"/>
+                    </a:schemeClr>
+                  </a:outerShdw>
+                </a:effectLst>
+              </a:rPr>
+              <a:t> = 0.45</a:t>
+            </a:r>
+            <a:endParaRPr lang="en-US" sz="2000" b="0" cap="none" spc="0" dirty="0">
+              <a:ln w="0"/>
+              <a:solidFill>
+                <a:schemeClr val="tx1"/>
+              </a:solidFill>
+              <a:effectLst>
+                <a:outerShdw blurRad="38100" dist="19050" dir="2700000" algn="tl" rotWithShape="0">
+                  <a:schemeClr val="dk1">
+                    <a:alpha val="40000"/>
+                  </a:schemeClr>
+                </a:outerShdw>
+              </a:effectLst>
+            </a:endParaRPr>
+          </a:p>
+        </p:txBody>
+      </p:sp>
+      <p:pic>
+        <p:nvPicPr>
+          <p:cNvPr id="11" name="Picture 10">
+            <a:extLst>
+              <a:ext uri="{FF2B5EF4-FFF2-40B4-BE49-F238E27FC236}">
+                <a16:creationId xmlns:a16="http://schemas.microsoft.com/office/drawing/2014/main" id="{DB7B343C-ED80-ED2B-217E-190F8A86E841}"/>
+              </a:ext>
+            </a:extLst>
+          </p:cNvPr>
+          <p:cNvPicPr>
+            <a:picLocks noChangeAspect="1"/>
+          </p:cNvPicPr>
+          <p:nvPr/>
+        </p:nvPicPr>
+        <p:blipFill>
+          <a:blip r:embed="rId4"/>
+          <a:stretch>
+            <a:fillRect/>
+          </a:stretch>
+        </p:blipFill>
+        <p:spPr>
+          <a:xfrm>
+            <a:off x="5645641" y="3892622"/>
+            <a:ext cx="2944566" cy="2451801"/>
+          </a:xfrm>
+          <a:prstGeom prst="rect">
+            <a:avLst/>
+          </a:prstGeom>
+        </p:spPr>
+      </p:pic>
+      <p:pic>
+        <p:nvPicPr>
+          <p:cNvPr id="13" name="Picture 12">
+            <a:extLst>
+              <a:ext uri="{FF2B5EF4-FFF2-40B4-BE49-F238E27FC236}">
+                <a16:creationId xmlns:a16="http://schemas.microsoft.com/office/drawing/2014/main" id="{EF9FF2F6-4CDA-7B3F-38B7-D45D348A8759}"/>
+              </a:ext>
+            </a:extLst>
+          </p:cNvPr>
+          <p:cNvPicPr>
+            <a:picLocks noChangeAspect="1"/>
+          </p:cNvPicPr>
+          <p:nvPr/>
+        </p:nvPicPr>
+        <p:blipFill>
+          <a:blip r:embed="rId5"/>
+          <a:stretch>
+            <a:fillRect/>
+          </a:stretch>
+        </p:blipFill>
+        <p:spPr>
+          <a:xfrm>
+            <a:off x="8721031" y="3763448"/>
+            <a:ext cx="2881586" cy="2784235"/>
+          </a:xfrm>
+          <a:prstGeom prst="rect">
+            <a:avLst/>
+          </a:prstGeom>
+        </p:spPr>
+      </p:pic>
+      <p:pic>
+        <p:nvPicPr>
+          <p:cNvPr id="15" name="Picture 14">
+            <a:extLst>
+              <a:ext uri="{FF2B5EF4-FFF2-40B4-BE49-F238E27FC236}">
+                <a16:creationId xmlns:a16="http://schemas.microsoft.com/office/drawing/2014/main" id="{15BF4B38-8963-8487-A869-16688E65D71E}"/>
+              </a:ext>
+            </a:extLst>
+          </p:cNvPr>
+          <p:cNvPicPr>
+            <a:picLocks noChangeAspect="1"/>
+          </p:cNvPicPr>
+          <p:nvPr/>
+        </p:nvPicPr>
+        <p:blipFill>
+          <a:blip r:embed="rId6"/>
+          <a:stretch>
+            <a:fillRect/>
+          </a:stretch>
+        </p:blipFill>
+        <p:spPr>
+          <a:xfrm>
+            <a:off x="2787916" y="686612"/>
+            <a:ext cx="2694826" cy="2603785"/>
+          </a:xfrm>
+          <a:prstGeom prst="rect">
+            <a:avLst/>
+          </a:prstGeom>
+        </p:spPr>
+      </p:pic>
+      <p:sp>
+        <p:nvSpPr>
+          <p:cNvPr id="16" name="Rectangle 15">
+            <a:extLst>
+              <a:ext uri="{FF2B5EF4-FFF2-40B4-BE49-F238E27FC236}">
+                <a16:creationId xmlns:a16="http://schemas.microsoft.com/office/drawing/2014/main" id="{AEF7291D-1EEC-405A-787B-EF43ED321BAB}"/>
+              </a:ext>
+            </a:extLst>
+          </p:cNvPr>
+          <p:cNvSpPr/>
+          <p:nvPr/>
+        </p:nvSpPr>
+        <p:spPr>
+          <a:xfrm>
+            <a:off x="3156504" y="547324"/>
+            <a:ext cx="2621038" cy="400110"/>
+          </a:xfrm>
+          <a:prstGeom prst="rect">
+            <a:avLst/>
+          </a:prstGeom>
+          <a:noFill/>
+        </p:spPr>
+        <p:txBody>
+          <a:bodyPr wrap="none" lIns="91440" tIns="45720" rIns="91440" bIns="45720">
+            <a:spAutoFit/>
+          </a:bodyPr>
+          <a:lstStyle/>
+          <a:p>
+            <a:pPr algn="ctr"/>
+            <a:r>
+              <a:rPr lang="en-US" sz="2000" b="0" cap="none" spc="0" dirty="0">
+                <a:ln w="0"/>
+                <a:solidFill>
+                  <a:schemeClr val="tx1"/>
+                </a:solidFill>
+                <a:effectLst>
+                  <a:outerShdw blurRad="38100" dist="19050" dir="2700000" algn="tl" rotWithShape="0">
+                    <a:schemeClr val="dk1">
+                      <a:alpha val="40000"/>
+                    </a:schemeClr>
+                  </a:outerShdw>
+                </a:effectLst>
+              </a:rPr>
+              <a:t>Minor allel</a:t>
+            </a:r>
+            <a:r>
+              <a:rPr lang="en-US" sz="2000" dirty="0">
+                <a:ln w="0"/>
+                <a:effectLst>
+                  <a:outerShdw blurRad="38100" dist="19050" dir="2700000" algn="tl" rotWithShape="0">
+                    <a:schemeClr val="dk1">
+                      <a:alpha val="40000"/>
+                    </a:schemeClr>
+                  </a:outerShdw>
+                </a:effectLst>
+              </a:rPr>
+              <a:t>e </a:t>
+            </a:r>
+            <a:r>
+              <a:rPr lang="en-US" sz="2000" dirty="0" err="1">
+                <a:ln w="0"/>
+                <a:effectLst>
+                  <a:outerShdw blurRad="38100" dist="19050" dir="2700000" algn="tl" rotWithShape="0">
+                    <a:schemeClr val="dk1">
+                      <a:alpha val="40000"/>
+                    </a:schemeClr>
+                  </a:outerShdw>
+                </a:effectLst>
+              </a:rPr>
+              <a:t>freq</a:t>
+            </a:r>
+            <a:r>
+              <a:rPr lang="en-US" sz="2000" dirty="0">
+                <a:ln w="0"/>
+                <a:effectLst>
+                  <a:outerShdw blurRad="38100" dist="19050" dir="2700000" algn="tl" rotWithShape="0">
+                    <a:schemeClr val="dk1">
+                      <a:alpha val="40000"/>
+                    </a:schemeClr>
+                  </a:outerShdw>
+                </a:effectLst>
+              </a:rPr>
+              <a:t> = 0.07</a:t>
+            </a:r>
+            <a:endParaRPr lang="en-US" sz="2000" b="0" cap="none" spc="0" dirty="0">
+              <a:ln w="0"/>
+              <a:solidFill>
+                <a:schemeClr val="tx1"/>
+              </a:solidFill>
+              <a:effectLst>
+                <a:outerShdw blurRad="38100" dist="19050" dir="2700000" algn="tl" rotWithShape="0">
+                  <a:schemeClr val="dk1">
+                    <a:alpha val="40000"/>
+                  </a:schemeClr>
+                </a:outerShdw>
+              </a:effectLst>
+            </a:endParaRPr>
+          </a:p>
+        </p:txBody>
+      </p:sp>
+      <p:pic>
+        <p:nvPicPr>
+          <p:cNvPr id="18" name="Picture 17">
+            <a:extLst>
+              <a:ext uri="{FF2B5EF4-FFF2-40B4-BE49-F238E27FC236}">
+                <a16:creationId xmlns:a16="http://schemas.microsoft.com/office/drawing/2014/main" id="{D17BCF0F-8AA1-BB0C-A994-EAB67F37DF20}"/>
+              </a:ext>
+            </a:extLst>
+          </p:cNvPr>
+          <p:cNvPicPr>
+            <a:picLocks noChangeAspect="1"/>
+          </p:cNvPicPr>
+          <p:nvPr/>
+        </p:nvPicPr>
+        <p:blipFill>
+          <a:blip r:embed="rId7"/>
+          <a:stretch>
+            <a:fillRect/>
+          </a:stretch>
+        </p:blipFill>
+        <p:spPr>
+          <a:xfrm>
+            <a:off x="5839445" y="753923"/>
+            <a:ext cx="2881586" cy="2784235"/>
+          </a:xfrm>
+          <a:prstGeom prst="rect">
+            <a:avLst/>
+          </a:prstGeom>
+        </p:spPr>
+      </p:pic>
+      <p:pic>
+        <p:nvPicPr>
+          <p:cNvPr id="20" name="Picture 19">
+            <a:extLst>
+              <a:ext uri="{FF2B5EF4-FFF2-40B4-BE49-F238E27FC236}">
+                <a16:creationId xmlns:a16="http://schemas.microsoft.com/office/drawing/2014/main" id="{9E70AC9B-37DD-C11C-C707-F112FF7AED62}"/>
+              </a:ext>
+            </a:extLst>
+          </p:cNvPr>
+          <p:cNvPicPr>
+            <a:picLocks noChangeAspect="1"/>
+          </p:cNvPicPr>
+          <p:nvPr/>
+        </p:nvPicPr>
+        <p:blipFill>
+          <a:blip r:embed="rId8"/>
+          <a:stretch>
+            <a:fillRect/>
+          </a:stretch>
+        </p:blipFill>
+        <p:spPr>
+          <a:xfrm>
+            <a:off x="8972955" y="779157"/>
+            <a:ext cx="2881587" cy="2784236"/>
+          </a:xfrm>
+          <a:prstGeom prst="rect">
+            <a:avLst/>
+          </a:prstGeom>
+        </p:spPr>
+      </p:pic>
+    </p:spTree>
+    <p:extLst>
+      <p:ext uri="{BB962C8B-B14F-4D97-AF65-F5344CB8AC3E}">
+        <p14:creationId xmlns:p14="http://schemas.microsoft.com/office/powerpoint/2010/main" val="772700673"/>
+      </p:ext>
+    </p:extLst>
+  </p:cSld>
+  <p:clrMapOvr>
+    <a:masterClrMapping/>
+  </p:clrMapOvr>
+</p:sld>
+</file>
+
+<file path=ppt/slides/slide16.xml><?xml version="1.0" encoding="utf-8"?>
+<p:sld xmlns:a="http://schemas.openxmlformats.org/drawingml/2006/main" xmlns:r="http://schemas.openxmlformats.org/officeDocument/2006/relationships" xmlns:p="http://schemas.openxmlformats.org/presentationml/2006/main">
+  <p:cSld>
+    <p:spTree>
+      <p:nvGrpSpPr>
+        <p:cNvPr id="1" name=""/>
+        <p:cNvGrpSpPr/>
+        <p:nvPr/>
+      </p:nvGrpSpPr>
+      <p:grpSpPr>
+        <a:xfrm>
+          <a:off x="0" y="0"/>
+          <a:ext cx="0" cy="0"/>
+          <a:chOff x="0" y="0"/>
+          <a:chExt cx="0" cy="0"/>
+        </a:xfrm>
+      </p:grpSpPr>
+      <p:pic>
+        <p:nvPicPr>
+          <p:cNvPr id="5" name="Picture 4">
+            <a:extLst>
+              <a:ext uri="{FF2B5EF4-FFF2-40B4-BE49-F238E27FC236}">
                 <a16:creationId xmlns:a16="http://schemas.microsoft.com/office/drawing/2014/main" id="{B72E790C-B4A5-4810-B686-3808058AA535}"/>
               </a:ext>
             </a:extLst>
@@ -5429,7 +5912,426 @@
 </p:sld>
 </file>
 
-<file path=ppt/slides/slide16.xml><?xml version="1.0" encoding="utf-8"?>
+<file path=ppt/slides/slide17.xml><?xml version="1.0" encoding="utf-8"?>
+<p:sld xmlns:a="http://schemas.openxmlformats.org/drawingml/2006/main" xmlns:r="http://schemas.openxmlformats.org/officeDocument/2006/relationships" xmlns:p="http://schemas.openxmlformats.org/presentationml/2006/main">
+  <p:cSld>
+    <p:spTree>
+      <p:nvGrpSpPr>
+        <p:cNvPr id="1" name=""/>
+        <p:cNvGrpSpPr/>
+        <p:nvPr/>
+      </p:nvGrpSpPr>
+      <p:grpSpPr>
+        <a:xfrm>
+          <a:off x="0" y="0"/>
+          <a:ext cx="0" cy="0"/>
+          <a:chOff x="0" y="0"/>
+          <a:chExt cx="0" cy="0"/>
+        </a:xfrm>
+      </p:grpSpPr>
+      <p:sp>
+        <p:nvSpPr>
+          <p:cNvPr id="4" name="TextBox 3">
+            <a:extLst>
+              <a:ext uri="{FF2B5EF4-FFF2-40B4-BE49-F238E27FC236}">
+                <a16:creationId xmlns:a16="http://schemas.microsoft.com/office/drawing/2014/main" id="{0F3DDA22-B8F8-2763-52CA-639471D6ED16}"/>
+              </a:ext>
+            </a:extLst>
+          </p:cNvPr>
+          <p:cNvSpPr txBox="1"/>
+          <p:nvPr/>
+        </p:nvSpPr>
+        <p:spPr>
+          <a:xfrm>
+            <a:off x="1716494" y="30127"/>
+            <a:ext cx="9174627" cy="369332"/>
+          </a:xfrm>
+          <a:prstGeom prst="rect">
+            <a:avLst/>
+          </a:prstGeom>
+          <a:noFill/>
+        </p:spPr>
+        <p:txBody>
+          <a:bodyPr wrap="none" rtlCol="0">
+            <a:spAutoFit/>
+          </a:bodyPr>
+          <a:lstStyle/>
+          <a:p>
+            <a:r>
+              <a:rPr lang="en-US" dirty="0"/>
+              <a:t>Reproductive output values among migration rates when simulating a </a:t>
+            </a:r>
+            <a:r>
+              <a:rPr lang="en-US" b="1" u="sng" dirty="0"/>
+              <a:t>critically endangered pop </a:t>
+            </a:r>
+          </a:p>
+        </p:txBody>
+      </p:sp>
+      <p:sp>
+        <p:nvSpPr>
+          <p:cNvPr id="5" name="Rectangle 4">
+            <a:extLst>
+              <a:ext uri="{FF2B5EF4-FFF2-40B4-BE49-F238E27FC236}">
+                <a16:creationId xmlns:a16="http://schemas.microsoft.com/office/drawing/2014/main" id="{EE0996AF-68DB-1454-3C3A-FF8B989CA9EA}"/>
+              </a:ext>
+            </a:extLst>
+          </p:cNvPr>
+          <p:cNvSpPr/>
+          <p:nvPr/>
+        </p:nvSpPr>
+        <p:spPr>
+          <a:xfrm>
+            <a:off x="3158007" y="3236474"/>
+            <a:ext cx="2621039" cy="400110"/>
+          </a:xfrm>
+          <a:prstGeom prst="rect">
+            <a:avLst/>
+          </a:prstGeom>
+          <a:noFill/>
+        </p:spPr>
+        <p:txBody>
+          <a:bodyPr wrap="none" lIns="91440" tIns="45720" rIns="91440" bIns="45720">
+            <a:spAutoFit/>
+          </a:bodyPr>
+          <a:lstStyle/>
+          <a:p>
+            <a:pPr algn="ctr"/>
+            <a:r>
+              <a:rPr lang="en-US" sz="2000" b="0" cap="none" spc="0" dirty="0">
+                <a:ln w="0"/>
+                <a:solidFill>
+                  <a:schemeClr val="tx1"/>
+                </a:solidFill>
+                <a:effectLst>
+                  <a:outerShdw blurRad="38100" dist="19050" dir="2700000" algn="tl" rotWithShape="0">
+                    <a:schemeClr val="dk1">
+                      <a:alpha val="40000"/>
+                    </a:schemeClr>
+                  </a:outerShdw>
+                </a:effectLst>
+              </a:rPr>
+              <a:t>Minor allel</a:t>
+            </a:r>
+            <a:r>
+              <a:rPr lang="en-US" sz="2000" dirty="0">
+                <a:ln w="0"/>
+                <a:effectLst>
+                  <a:outerShdw blurRad="38100" dist="19050" dir="2700000" algn="tl" rotWithShape="0">
+                    <a:schemeClr val="dk1">
+                      <a:alpha val="40000"/>
+                    </a:schemeClr>
+                  </a:outerShdw>
+                </a:effectLst>
+              </a:rPr>
+              <a:t>e </a:t>
+            </a:r>
+            <a:r>
+              <a:rPr lang="en-US" sz="2000" dirty="0" err="1">
+                <a:ln w="0"/>
+                <a:effectLst>
+                  <a:outerShdw blurRad="38100" dist="19050" dir="2700000" algn="tl" rotWithShape="0">
+                    <a:schemeClr val="dk1">
+                      <a:alpha val="40000"/>
+                    </a:schemeClr>
+                  </a:outerShdw>
+                </a:effectLst>
+              </a:rPr>
+              <a:t>freq</a:t>
+            </a:r>
+            <a:r>
+              <a:rPr lang="en-US" sz="2000" dirty="0">
+                <a:ln w="0"/>
+                <a:effectLst>
+                  <a:outerShdw blurRad="38100" dist="19050" dir="2700000" algn="tl" rotWithShape="0">
+                    <a:schemeClr val="dk1">
+                      <a:alpha val="40000"/>
+                    </a:schemeClr>
+                  </a:outerShdw>
+                </a:effectLst>
+              </a:rPr>
+              <a:t> = 0.45</a:t>
+            </a:r>
+            <a:endParaRPr lang="en-US" sz="2000" b="0" cap="none" spc="0" dirty="0">
+              <a:ln w="0"/>
+              <a:solidFill>
+                <a:schemeClr val="tx1"/>
+              </a:solidFill>
+              <a:effectLst>
+                <a:outerShdw blurRad="38100" dist="19050" dir="2700000" algn="tl" rotWithShape="0">
+                  <a:schemeClr val="dk1">
+                    <a:alpha val="40000"/>
+                  </a:schemeClr>
+                </a:outerShdw>
+              </a:effectLst>
+            </a:endParaRPr>
+          </a:p>
+        </p:txBody>
+      </p:sp>
+      <p:pic>
+        <p:nvPicPr>
+          <p:cNvPr id="6" name="Picture 5">
+            <a:extLst>
+              <a:ext uri="{FF2B5EF4-FFF2-40B4-BE49-F238E27FC236}">
+                <a16:creationId xmlns:a16="http://schemas.microsoft.com/office/drawing/2014/main" id="{FDD4A79E-735A-CADD-B8C9-BA25F4A7B12F}"/>
+              </a:ext>
+            </a:extLst>
+          </p:cNvPr>
+          <p:cNvPicPr>
+            <a:picLocks noChangeAspect="1"/>
+          </p:cNvPicPr>
+          <p:nvPr/>
+        </p:nvPicPr>
+        <p:blipFill>
+          <a:blip r:embed="rId2"/>
+          <a:stretch>
+            <a:fillRect/>
+          </a:stretch>
+        </p:blipFill>
+        <p:spPr>
+          <a:xfrm>
+            <a:off x="144989" y="1520345"/>
+            <a:ext cx="2694826" cy="2603785"/>
+          </a:xfrm>
+          <a:prstGeom prst="rect">
+            <a:avLst/>
+          </a:prstGeom>
+        </p:spPr>
+      </p:pic>
+      <p:pic>
+        <p:nvPicPr>
+          <p:cNvPr id="8" name="Picture 7">
+            <a:extLst>
+              <a:ext uri="{FF2B5EF4-FFF2-40B4-BE49-F238E27FC236}">
+                <a16:creationId xmlns:a16="http://schemas.microsoft.com/office/drawing/2014/main" id="{3A890F60-F758-4DD1-C3F3-7276179050A1}"/>
+              </a:ext>
+            </a:extLst>
+          </p:cNvPr>
+          <p:cNvPicPr>
+            <a:picLocks noChangeAspect="1"/>
+          </p:cNvPicPr>
+          <p:nvPr/>
+        </p:nvPicPr>
+        <p:blipFill>
+          <a:blip r:embed="rId3"/>
+          <a:stretch>
+            <a:fillRect/>
+          </a:stretch>
+        </p:blipFill>
+        <p:spPr>
+          <a:xfrm>
+            <a:off x="3158007" y="3636584"/>
+            <a:ext cx="2819400" cy="2724150"/>
+          </a:xfrm>
+          <a:prstGeom prst="rect">
+            <a:avLst/>
+          </a:prstGeom>
+        </p:spPr>
+      </p:pic>
+      <p:pic>
+        <p:nvPicPr>
+          <p:cNvPr id="10" name="Picture 9">
+            <a:extLst>
+              <a:ext uri="{FF2B5EF4-FFF2-40B4-BE49-F238E27FC236}">
+                <a16:creationId xmlns:a16="http://schemas.microsoft.com/office/drawing/2014/main" id="{E89956BF-6D8C-4B76-D98E-A61033D3D4B1}"/>
+              </a:ext>
+            </a:extLst>
+          </p:cNvPr>
+          <p:cNvPicPr>
+            <a:picLocks noChangeAspect="1"/>
+          </p:cNvPicPr>
+          <p:nvPr/>
+        </p:nvPicPr>
+        <p:blipFill>
+          <a:blip r:embed="rId4"/>
+          <a:stretch>
+            <a:fillRect/>
+          </a:stretch>
+        </p:blipFill>
+        <p:spPr>
+          <a:xfrm>
+            <a:off x="6096000" y="3676239"/>
+            <a:ext cx="2737317" cy="2644840"/>
+          </a:xfrm>
+          <a:prstGeom prst="rect">
+            <a:avLst/>
+          </a:prstGeom>
+        </p:spPr>
+      </p:pic>
+      <p:sp>
+        <p:nvSpPr>
+          <p:cNvPr id="11" name="Rectangle 10">
+            <a:extLst>
+              <a:ext uri="{FF2B5EF4-FFF2-40B4-BE49-F238E27FC236}">
+                <a16:creationId xmlns:a16="http://schemas.microsoft.com/office/drawing/2014/main" id="{53A93BDB-E084-70C2-9A5E-B9B31D6213E0}"/>
+              </a:ext>
+            </a:extLst>
+          </p:cNvPr>
+          <p:cNvSpPr/>
+          <p:nvPr/>
+        </p:nvSpPr>
+        <p:spPr>
+          <a:xfrm>
+            <a:off x="3156504" y="351543"/>
+            <a:ext cx="2621038" cy="400110"/>
+          </a:xfrm>
+          <a:prstGeom prst="rect">
+            <a:avLst/>
+          </a:prstGeom>
+          <a:noFill/>
+        </p:spPr>
+        <p:txBody>
+          <a:bodyPr wrap="none" lIns="91440" tIns="45720" rIns="91440" bIns="45720">
+            <a:spAutoFit/>
+          </a:bodyPr>
+          <a:lstStyle/>
+          <a:p>
+            <a:pPr algn="ctr"/>
+            <a:r>
+              <a:rPr lang="en-US" sz="2000" b="0" cap="none" spc="0" dirty="0">
+                <a:ln w="0"/>
+                <a:solidFill>
+                  <a:schemeClr val="tx1"/>
+                </a:solidFill>
+                <a:effectLst>
+                  <a:outerShdw blurRad="38100" dist="19050" dir="2700000" algn="tl" rotWithShape="0">
+                    <a:schemeClr val="dk1">
+                      <a:alpha val="40000"/>
+                    </a:schemeClr>
+                  </a:outerShdw>
+                </a:effectLst>
+              </a:rPr>
+              <a:t>Minor allel</a:t>
+            </a:r>
+            <a:r>
+              <a:rPr lang="en-US" sz="2000" dirty="0">
+                <a:ln w="0"/>
+                <a:effectLst>
+                  <a:outerShdw blurRad="38100" dist="19050" dir="2700000" algn="tl" rotWithShape="0">
+                    <a:schemeClr val="dk1">
+                      <a:alpha val="40000"/>
+                    </a:schemeClr>
+                  </a:outerShdw>
+                </a:effectLst>
+              </a:rPr>
+              <a:t>e </a:t>
+            </a:r>
+            <a:r>
+              <a:rPr lang="en-US" sz="2000" dirty="0" err="1">
+                <a:ln w="0"/>
+                <a:effectLst>
+                  <a:outerShdw blurRad="38100" dist="19050" dir="2700000" algn="tl" rotWithShape="0">
+                    <a:schemeClr val="dk1">
+                      <a:alpha val="40000"/>
+                    </a:schemeClr>
+                  </a:outerShdw>
+                </a:effectLst>
+              </a:rPr>
+              <a:t>freq</a:t>
+            </a:r>
+            <a:r>
+              <a:rPr lang="en-US" sz="2000" dirty="0">
+                <a:ln w="0"/>
+                <a:effectLst>
+                  <a:outerShdw blurRad="38100" dist="19050" dir="2700000" algn="tl" rotWithShape="0">
+                    <a:schemeClr val="dk1">
+                      <a:alpha val="40000"/>
+                    </a:schemeClr>
+                  </a:outerShdw>
+                </a:effectLst>
+              </a:rPr>
+              <a:t> = 0.07</a:t>
+            </a:r>
+            <a:endParaRPr lang="en-US" sz="2000" b="0" cap="none" spc="0" dirty="0">
+              <a:ln w="0"/>
+              <a:solidFill>
+                <a:schemeClr val="tx1"/>
+              </a:solidFill>
+              <a:effectLst>
+                <a:outerShdw blurRad="38100" dist="19050" dir="2700000" algn="tl" rotWithShape="0">
+                  <a:schemeClr val="dk1">
+                    <a:alpha val="40000"/>
+                  </a:schemeClr>
+                </a:outerShdw>
+              </a:effectLst>
+            </a:endParaRPr>
+          </a:p>
+        </p:txBody>
+      </p:sp>
+      <p:pic>
+        <p:nvPicPr>
+          <p:cNvPr id="17" name="Picture 16">
+            <a:extLst>
+              <a:ext uri="{FF2B5EF4-FFF2-40B4-BE49-F238E27FC236}">
+                <a16:creationId xmlns:a16="http://schemas.microsoft.com/office/drawing/2014/main" id="{32A31CB5-4E9B-6BAB-6EAC-980501D7C34D}"/>
+              </a:ext>
+            </a:extLst>
+          </p:cNvPr>
+          <p:cNvPicPr>
+            <a:picLocks noChangeAspect="1"/>
+          </p:cNvPicPr>
+          <p:nvPr/>
+        </p:nvPicPr>
+        <p:blipFill>
+          <a:blip r:embed="rId5"/>
+          <a:stretch>
+            <a:fillRect/>
+          </a:stretch>
+        </p:blipFill>
+        <p:spPr>
+          <a:xfrm>
+            <a:off x="3199048" y="671643"/>
+            <a:ext cx="2737318" cy="2644841"/>
+          </a:xfrm>
+          <a:prstGeom prst="rect">
+            <a:avLst/>
+          </a:prstGeom>
+        </p:spPr>
+      </p:pic>
+      <p:pic>
+        <p:nvPicPr>
+          <p:cNvPr id="19" name="Picture 18">
+            <a:extLst>
+              <a:ext uri="{FF2B5EF4-FFF2-40B4-BE49-F238E27FC236}">
+                <a16:creationId xmlns:a16="http://schemas.microsoft.com/office/drawing/2014/main" id="{2EDE4BAD-3CB7-F178-B84E-A61E317CEC4E}"/>
+              </a:ext>
+            </a:extLst>
+          </p:cNvPr>
+          <p:cNvPicPr>
+            <a:picLocks noChangeAspect="1"/>
+          </p:cNvPicPr>
+          <p:nvPr/>
+        </p:nvPicPr>
+        <p:blipFill>
+          <a:blip r:embed="rId6"/>
+          <a:stretch>
+            <a:fillRect/>
+          </a:stretch>
+        </p:blipFill>
+        <p:spPr>
+          <a:xfrm>
+            <a:off x="6136775" y="631988"/>
+            <a:ext cx="2819400" cy="2724150"/>
+          </a:xfrm>
+          <a:prstGeom prst="rect">
+            <a:avLst/>
+          </a:prstGeom>
+        </p:spPr>
+      </p:pic>
+    </p:spTree>
+    <p:extLst>
+      <p:ext uri="{BB962C8B-B14F-4D97-AF65-F5344CB8AC3E}">
+        <p14:creationId xmlns:p14="http://schemas.microsoft.com/office/powerpoint/2010/main" val="4255001086"/>
+      </p:ext>
+    </p:extLst>
+  </p:cSld>
+  <p:clrMapOvr>
+    <a:masterClrMapping/>
+  </p:clrMapOvr>
+</p:sld>
+</file>
+
+<file path=ppt/slides/slide18.xml><?xml version="1.0" encoding="utf-8"?>
 <p:sld xmlns:a="http://schemas.openxmlformats.org/drawingml/2006/main" xmlns:r="http://schemas.openxmlformats.org/officeDocument/2006/relationships" xmlns:p="http://schemas.openxmlformats.org/presentationml/2006/main">
   <p:cSld>
     <p:spTree>
@@ -5649,7 +6551,7 @@
 </p:sld>
 </file>
 
-<file path=ppt/slides/slide17.xml><?xml version="1.0" encoding="utf-8"?>
+<file path=ppt/slides/slide19.xml><?xml version="1.0" encoding="utf-8"?>
 <p:sld xmlns:a="http://schemas.openxmlformats.org/drawingml/2006/main" xmlns:r="http://schemas.openxmlformats.org/officeDocument/2006/relationships" xmlns:p="http://schemas.openxmlformats.org/presentationml/2006/main">
   <p:cSld>
     <p:bg>
@@ -5768,7 +6670,114 @@
 </p:sld>
 </file>
 
-<file path=ppt/slides/slide18.xml><?xml version="1.0" encoding="utf-8"?>
+<file path=ppt/slides/slide2.xml><?xml version="1.0" encoding="utf-8"?>
+<p:sld xmlns:a="http://schemas.openxmlformats.org/drawingml/2006/main" xmlns:r="http://schemas.openxmlformats.org/officeDocument/2006/relationships" xmlns:p="http://schemas.openxmlformats.org/presentationml/2006/main">
+  <p:cSld>
+    <p:bg>
+      <p:bgPr>
+        <a:solidFill>
+          <a:schemeClr val="tx1"/>
+        </a:solidFill>
+        <a:effectLst/>
+      </p:bgPr>
+    </p:bg>
+    <p:spTree>
+      <p:nvGrpSpPr>
+        <p:cNvPr id="1" name=""/>
+        <p:cNvGrpSpPr/>
+        <p:nvPr/>
+      </p:nvGrpSpPr>
+      <p:grpSpPr>
+        <a:xfrm>
+          <a:off x="0" y="0"/>
+          <a:ext cx="0" cy="0"/>
+          <a:chOff x="0" y="0"/>
+          <a:chExt cx="0" cy="0"/>
+        </a:xfrm>
+      </p:grpSpPr>
+      <p:sp>
+        <p:nvSpPr>
+          <p:cNvPr id="2" name="Title 1">
+            <a:extLst>
+              <a:ext uri="{FF2B5EF4-FFF2-40B4-BE49-F238E27FC236}">
+                <a16:creationId xmlns:a16="http://schemas.microsoft.com/office/drawing/2014/main" id="{4262B07B-7B80-E718-3ED5-A237AD031900}"/>
+              </a:ext>
+            </a:extLst>
+          </p:cNvPr>
+          <p:cNvSpPr>
+            <a:spLocks noGrp="1"/>
+          </p:cNvSpPr>
+          <p:nvPr>
+            <p:ph type="title"/>
+          </p:nvPr>
+        </p:nvSpPr>
+        <p:spPr>
+          <a:xfrm>
+            <a:off x="838200" y="1906542"/>
+            <a:ext cx="10515600" cy="1325563"/>
+          </a:xfrm>
+        </p:spPr>
+        <p:txBody>
+          <a:bodyPr>
+            <a:noAutofit/>
+          </a:bodyPr>
+          <a:lstStyle/>
+          <a:p>
+            <a:pPr algn="ctr"/>
+            <a:r>
+              <a:rPr lang="en-US" sz="5000" dirty="0">
+                <a:solidFill>
+                  <a:schemeClr val="bg1"/>
+                </a:solidFill>
+              </a:rPr>
+              <a:t>Comparison between the dropped population size (during the bottleneck) and various migration rates</a:t>
+            </a:r>
+          </a:p>
+        </p:txBody>
+      </p:sp>
+      <p:pic>
+        <p:nvPicPr>
+          <p:cNvPr id="4" name="Picture 3">
+            <a:extLst>
+              <a:ext uri="{FF2B5EF4-FFF2-40B4-BE49-F238E27FC236}">
+                <a16:creationId xmlns:a16="http://schemas.microsoft.com/office/drawing/2014/main" id="{A4A9A888-89C6-20D3-29A3-328855473207}"/>
+              </a:ext>
+            </a:extLst>
+          </p:cNvPr>
+          <p:cNvPicPr>
+            <a:picLocks noChangeAspect="1"/>
+          </p:cNvPicPr>
+          <p:nvPr/>
+        </p:nvPicPr>
+        <p:blipFill rotWithShape="1">
+          <a:blip r:embed="rId2"/>
+          <a:srcRect l="22563" t="32944" r="14469" b="37688"/>
+          <a:stretch/>
+        </p:blipFill>
+        <p:spPr>
+          <a:xfrm>
+            <a:off x="8045252" y="5033554"/>
+            <a:ext cx="4056553" cy="1723370"/>
+          </a:xfrm>
+          <a:prstGeom prst="rect">
+            <a:avLst/>
+          </a:prstGeom>
+        </p:spPr>
+      </p:pic>
+    </p:spTree>
+    <p:extLst>
+      <p:ext uri="{BB962C8B-B14F-4D97-AF65-F5344CB8AC3E}">
+        <p14:creationId xmlns:p14="http://schemas.microsoft.com/office/powerpoint/2010/main" val="473485054"/>
+      </p:ext>
+    </p:extLst>
+  </p:cSld>
+  <p:clrMapOvr>
+    <a:masterClrMapping/>
+  </p:clrMapOvr>
+</p:sld>
+</file>
+
+<file path=ppt/slides/slide20.xml><?xml version="1.0" encoding="utf-8"?>
 <p:sld xmlns:a="http://schemas.openxmlformats.org/drawingml/2006/main" xmlns:r="http://schemas.openxmlformats.org/officeDocument/2006/relationships" xmlns:p="http://schemas.openxmlformats.org/presentationml/2006/main">
   <p:cSld>
     <p:spTree>
@@ -6925,320 +7934,6 @@
 </p:sld>
 </file>
 
-<file path=ppt/slides/slide19.xml><?xml version="1.0" encoding="utf-8"?>
-<p:sld xmlns:a="http://schemas.openxmlformats.org/drawingml/2006/main" xmlns:r="http://schemas.openxmlformats.org/officeDocument/2006/relationships" xmlns:p="http://schemas.openxmlformats.org/presentationml/2006/main">
-  <p:cSld>
-    <p:spTree>
-      <p:nvGrpSpPr>
-        <p:cNvPr id="1" name=""/>
-        <p:cNvGrpSpPr/>
-        <p:nvPr/>
-      </p:nvGrpSpPr>
-      <p:grpSpPr>
-        <a:xfrm>
-          <a:off x="0" y="0"/>
-          <a:ext cx="0" cy="0"/>
-          <a:chOff x="0" y="0"/>
-          <a:chExt cx="0" cy="0"/>
-        </a:xfrm>
-      </p:grpSpPr>
-      <p:sp>
-        <p:nvSpPr>
-          <p:cNvPr id="2" name="Title 1">
-            <a:extLst>
-              <a:ext uri="{FF2B5EF4-FFF2-40B4-BE49-F238E27FC236}">
-                <a16:creationId xmlns:a16="http://schemas.microsoft.com/office/drawing/2014/main" id="{4541B357-1BED-5B88-4B07-7558E7DE3EDF}"/>
-              </a:ext>
-            </a:extLst>
-          </p:cNvPr>
-          <p:cNvSpPr>
-            <a:spLocks noGrp="1"/>
-          </p:cNvSpPr>
-          <p:nvPr>
-            <p:ph type="title"/>
-          </p:nvPr>
-        </p:nvSpPr>
-        <p:spPr/>
-        <p:txBody>
-          <a:bodyPr/>
-          <a:lstStyle/>
-          <a:p>
-            <a:r>
-              <a:rPr lang="en-US" dirty="0"/>
-              <a:t>Conclusions</a:t>
-            </a:r>
-          </a:p>
-        </p:txBody>
-      </p:sp>
-      <p:sp>
-        <p:nvSpPr>
-          <p:cNvPr id="3" name="Content Placeholder 2">
-            <a:extLst>
-              <a:ext uri="{FF2B5EF4-FFF2-40B4-BE49-F238E27FC236}">
-                <a16:creationId xmlns:a16="http://schemas.microsoft.com/office/drawing/2014/main" id="{86D14108-4042-8CBE-543E-ABB4388565F5}"/>
-              </a:ext>
-            </a:extLst>
-          </p:cNvPr>
-          <p:cNvSpPr>
-            <a:spLocks noGrp="1"/>
-          </p:cNvSpPr>
-          <p:nvPr>
-            <p:ph idx="1"/>
-          </p:nvPr>
-        </p:nvSpPr>
-        <p:spPr/>
-        <p:txBody>
-          <a:bodyPr>
-            <a:normAutofit fontScale="92500" lnSpcReduction="10000"/>
-          </a:bodyPr>
-          <a:lstStyle/>
-          <a:p>
-            <a:r>
-              <a:rPr lang="en-US" b="1" dirty="0"/>
-              <a:t>1. Does the increase in genetic variants provided to a population via  migration provide a long term influence on individual and population fitness?</a:t>
-            </a:r>
-            <a:r>
-              <a:rPr lang="en-US" dirty="0"/>
-              <a:t> We hypothesized that extremely small populations will retain more of the migrant-related genetic variants than populations with more moderate population crashes due to the population growth potential in extremely small populations.</a:t>
-            </a:r>
-          </a:p>
-          <a:p>
-            <a:endParaRPr lang="en-US" dirty="0"/>
-          </a:p>
-          <a:p>
-            <a:r>
-              <a:rPr lang="en-US" dirty="0">
-                <a:solidFill>
-                  <a:srgbClr val="FF0000"/>
-                </a:solidFill>
-              </a:rPr>
-              <a:t>The proportion of migrant SNPs retained in the population was greater in smaller populations when there was one migrant per generation. Additionally, small populations diverged from the original population and lost heterozygosity at a faster rate than larger populations at all migration rates.</a:t>
-            </a:r>
-          </a:p>
-        </p:txBody>
-      </p:sp>
-    </p:spTree>
-    <p:extLst>
-      <p:ext uri="{BB962C8B-B14F-4D97-AF65-F5344CB8AC3E}">
-        <p14:creationId xmlns:p14="http://schemas.microsoft.com/office/powerpoint/2010/main" val="4080773754"/>
-      </p:ext>
-    </p:extLst>
-  </p:cSld>
-  <p:clrMapOvr>
-    <a:masterClrMapping/>
-  </p:clrMapOvr>
-</p:sld>
-</file>
-
-<file path=ppt/slides/slide2.xml><?xml version="1.0" encoding="utf-8"?>
-<p:sld xmlns:a="http://schemas.openxmlformats.org/drawingml/2006/main" xmlns:r="http://schemas.openxmlformats.org/officeDocument/2006/relationships" xmlns:p="http://schemas.openxmlformats.org/presentationml/2006/main">
-  <p:cSld>
-    <p:bg>
-      <p:bgPr>
-        <a:solidFill>
-          <a:schemeClr val="tx1"/>
-        </a:solidFill>
-        <a:effectLst/>
-      </p:bgPr>
-    </p:bg>
-    <p:spTree>
-      <p:nvGrpSpPr>
-        <p:cNvPr id="1" name=""/>
-        <p:cNvGrpSpPr/>
-        <p:nvPr/>
-      </p:nvGrpSpPr>
-      <p:grpSpPr>
-        <a:xfrm>
-          <a:off x="0" y="0"/>
-          <a:ext cx="0" cy="0"/>
-          <a:chOff x="0" y="0"/>
-          <a:chExt cx="0" cy="0"/>
-        </a:xfrm>
-      </p:grpSpPr>
-      <p:sp>
-        <p:nvSpPr>
-          <p:cNvPr id="2" name="Title 1">
-            <a:extLst>
-              <a:ext uri="{FF2B5EF4-FFF2-40B4-BE49-F238E27FC236}">
-                <a16:creationId xmlns:a16="http://schemas.microsoft.com/office/drawing/2014/main" id="{4262B07B-7B80-E718-3ED5-A237AD031900}"/>
-              </a:ext>
-            </a:extLst>
-          </p:cNvPr>
-          <p:cNvSpPr>
-            <a:spLocks noGrp="1"/>
-          </p:cNvSpPr>
-          <p:nvPr>
-            <p:ph type="title"/>
-          </p:nvPr>
-        </p:nvSpPr>
-        <p:spPr>
-          <a:xfrm>
-            <a:off x="838200" y="1906542"/>
-            <a:ext cx="10515600" cy="1325563"/>
-          </a:xfrm>
-        </p:spPr>
-        <p:txBody>
-          <a:bodyPr>
-            <a:noAutofit/>
-          </a:bodyPr>
-          <a:lstStyle/>
-          <a:p>
-            <a:pPr algn="ctr"/>
-            <a:r>
-              <a:rPr lang="en-US" sz="5000" dirty="0">
-                <a:solidFill>
-                  <a:schemeClr val="bg1"/>
-                </a:solidFill>
-              </a:rPr>
-              <a:t>Comparison between the dropped population size (during the bottleneck) and various migration rates</a:t>
-            </a:r>
-          </a:p>
-        </p:txBody>
-      </p:sp>
-      <p:pic>
-        <p:nvPicPr>
-          <p:cNvPr id="4" name="Picture 3">
-            <a:extLst>
-              <a:ext uri="{FF2B5EF4-FFF2-40B4-BE49-F238E27FC236}">
-                <a16:creationId xmlns:a16="http://schemas.microsoft.com/office/drawing/2014/main" id="{A4A9A888-89C6-20D3-29A3-328855473207}"/>
-              </a:ext>
-            </a:extLst>
-          </p:cNvPr>
-          <p:cNvPicPr>
-            <a:picLocks noChangeAspect="1"/>
-          </p:cNvPicPr>
-          <p:nvPr/>
-        </p:nvPicPr>
-        <p:blipFill rotWithShape="1">
-          <a:blip r:embed="rId2"/>
-          <a:srcRect l="22563" t="32944" r="14469" b="37688"/>
-          <a:stretch/>
-        </p:blipFill>
-        <p:spPr>
-          <a:xfrm>
-            <a:off x="8045252" y="5033554"/>
-            <a:ext cx="4056553" cy="1723370"/>
-          </a:xfrm>
-          <a:prstGeom prst="rect">
-            <a:avLst/>
-          </a:prstGeom>
-        </p:spPr>
-      </p:pic>
-    </p:spTree>
-    <p:extLst>
-      <p:ext uri="{BB962C8B-B14F-4D97-AF65-F5344CB8AC3E}">
-        <p14:creationId xmlns:p14="http://schemas.microsoft.com/office/powerpoint/2010/main" val="473485054"/>
-      </p:ext>
-    </p:extLst>
-  </p:cSld>
-  <p:clrMapOvr>
-    <a:masterClrMapping/>
-  </p:clrMapOvr>
-</p:sld>
-</file>
-
-<file path=ppt/slides/slide20.xml><?xml version="1.0" encoding="utf-8"?>
-<p:sld xmlns:a="http://schemas.openxmlformats.org/drawingml/2006/main" xmlns:r="http://schemas.openxmlformats.org/officeDocument/2006/relationships" xmlns:p="http://schemas.openxmlformats.org/presentationml/2006/main">
-  <p:cSld>
-    <p:spTree>
-      <p:nvGrpSpPr>
-        <p:cNvPr id="1" name=""/>
-        <p:cNvGrpSpPr/>
-        <p:nvPr/>
-      </p:nvGrpSpPr>
-      <p:grpSpPr>
-        <a:xfrm>
-          <a:off x="0" y="0"/>
-          <a:ext cx="0" cy="0"/>
-          <a:chOff x="0" y="0"/>
-          <a:chExt cx="0" cy="0"/>
-        </a:xfrm>
-      </p:grpSpPr>
-      <p:sp>
-        <p:nvSpPr>
-          <p:cNvPr id="2" name="Title 1">
-            <a:extLst>
-              <a:ext uri="{FF2B5EF4-FFF2-40B4-BE49-F238E27FC236}">
-                <a16:creationId xmlns:a16="http://schemas.microsoft.com/office/drawing/2014/main" id="{4541B357-1BED-5B88-4B07-7558E7DE3EDF}"/>
-              </a:ext>
-            </a:extLst>
-          </p:cNvPr>
-          <p:cNvSpPr>
-            <a:spLocks noGrp="1"/>
-          </p:cNvSpPr>
-          <p:nvPr>
-            <p:ph type="title"/>
-          </p:nvPr>
-        </p:nvSpPr>
-        <p:spPr/>
-        <p:txBody>
-          <a:bodyPr/>
-          <a:lstStyle/>
-          <a:p>
-            <a:r>
-              <a:rPr lang="en-US" dirty="0"/>
-              <a:t>Conclusions</a:t>
-            </a:r>
-          </a:p>
-        </p:txBody>
-      </p:sp>
-      <p:sp>
-        <p:nvSpPr>
-          <p:cNvPr id="3" name="Content Placeholder 2">
-            <a:extLst>
-              <a:ext uri="{FF2B5EF4-FFF2-40B4-BE49-F238E27FC236}">
-                <a16:creationId xmlns:a16="http://schemas.microsoft.com/office/drawing/2014/main" id="{86D14108-4042-8CBE-543E-ABB4388565F5}"/>
-              </a:ext>
-            </a:extLst>
-          </p:cNvPr>
-          <p:cNvSpPr>
-            <a:spLocks noGrp="1"/>
-          </p:cNvSpPr>
-          <p:nvPr>
-            <p:ph idx="1"/>
-          </p:nvPr>
-        </p:nvSpPr>
-        <p:spPr/>
-        <p:txBody>
-          <a:bodyPr>
-            <a:normAutofit/>
-          </a:bodyPr>
-          <a:lstStyle/>
-          <a:p>
-            <a:r>
-              <a:rPr lang="en-US" b="1" dirty="0"/>
-              <a:t>2. Do migrants with particularly high fitness affect the receiving population’s long-term stability more so than migrants with moderate or low lifetime fitness? </a:t>
-            </a:r>
-            <a:r>
-              <a:rPr lang="en-US" dirty="0"/>
-              <a:t>We hypothesize that migrants with high fitness may result in more unstable populations long-term than migrants with lower fitness, since high fitness individuals may cause inbreeding to increase as offspring from high fitness individuals reproduce.</a:t>
-            </a:r>
-          </a:p>
-          <a:p>
-            <a:r>
-              <a:rPr lang="en-US" dirty="0">
-                <a:solidFill>
-                  <a:srgbClr val="FF0000"/>
-                </a:solidFill>
-              </a:rPr>
-              <a:t>LRS and RRS were higher in populations where migrants had a lower minor allele frequency (aka lower heterozygosity) with no change in inbreeding values.</a:t>
-            </a:r>
-          </a:p>
-        </p:txBody>
-      </p:sp>
-    </p:spTree>
-    <p:extLst>
-      <p:ext uri="{BB962C8B-B14F-4D97-AF65-F5344CB8AC3E}">
-        <p14:creationId xmlns:p14="http://schemas.microsoft.com/office/powerpoint/2010/main" val="3320240485"/>
-      </p:ext>
-    </p:extLst>
-  </p:cSld>
-  <p:clrMapOvr>
-    <a:masterClrMapping/>
-  </p:clrMapOvr>
-</p:sld>
-</file>
-
 <file path=ppt/slides/slide21.xml><?xml version="1.0" encoding="utf-8"?>
 <p:sld xmlns:a="http://schemas.openxmlformats.org/drawingml/2006/main" xmlns:r="http://schemas.openxmlformats.org/officeDocument/2006/relationships" xmlns:p="http://schemas.openxmlformats.org/presentationml/2006/main">
   <p:cSld>
@@ -7261,6 +7956,3374 @@
           <p:cNvPr id="2" name="Title 1">
             <a:extLst>
               <a:ext uri="{FF2B5EF4-FFF2-40B4-BE49-F238E27FC236}">
+                <a16:creationId xmlns:a16="http://schemas.microsoft.com/office/drawing/2014/main" id="{1626DB6B-6699-B3C4-66E1-E4755C15C94C}"/>
+              </a:ext>
+            </a:extLst>
+          </p:cNvPr>
+          <p:cNvSpPr>
+            <a:spLocks noGrp="1"/>
+          </p:cNvSpPr>
+          <p:nvPr>
+            <p:ph type="title"/>
+          </p:nvPr>
+        </p:nvSpPr>
+        <p:spPr>
+          <a:xfrm>
+            <a:off x="838194" y="19431"/>
+            <a:ext cx="10515600" cy="585851"/>
+          </a:xfrm>
+        </p:spPr>
+        <p:txBody>
+          <a:bodyPr>
+            <a:normAutofit/>
+          </a:bodyPr>
+          <a:lstStyle/>
+          <a:p>
+            <a:r>
+              <a:rPr lang="en-US" sz="3200" dirty="0" err="1"/>
+              <a:t>RepSucc</a:t>
+            </a:r>
+            <a:r>
+              <a:rPr lang="en-US" sz="3200" dirty="0"/>
+              <a:t> Table (complete)</a:t>
+            </a:r>
+          </a:p>
+        </p:txBody>
+      </p:sp>
+      <p:graphicFrame>
+        <p:nvGraphicFramePr>
+          <p:cNvPr id="7" name="Table 7">
+            <a:extLst>
+              <a:ext uri="{FF2B5EF4-FFF2-40B4-BE49-F238E27FC236}">
+                <a16:creationId xmlns:a16="http://schemas.microsoft.com/office/drawing/2014/main" id="{5E1AAC85-5C8F-AE02-7341-09673470E4DE}"/>
+              </a:ext>
+            </a:extLst>
+          </p:cNvPr>
+          <p:cNvGraphicFramePr>
+            <a:graphicFrameLocks noGrp="1"/>
+          </p:cNvGraphicFramePr>
+          <p:nvPr>
+            <p:ph idx="1"/>
+            <p:extLst>
+              <p:ext uri="{D42A27DB-BD31-4B8C-83A1-F6EECF244321}">
+                <p14:modId xmlns:p14="http://schemas.microsoft.com/office/powerpoint/2010/main" val="2206427471"/>
+              </p:ext>
+            </p:extLst>
+          </p:nvPr>
+        </p:nvGraphicFramePr>
+        <p:xfrm>
+          <a:off x="838194" y="819785"/>
+          <a:ext cx="10515603" cy="5191760"/>
+        </p:xfrm>
+        <a:graphic>
+          <a:graphicData uri="http://schemas.openxmlformats.org/drawingml/2006/table">
+            <a:tbl>
+              <a:tblPr firstRow="1" bandRow="1">
+                <a:tableStyleId>{5C22544A-7EE6-4342-B048-85BDC9FD1C3A}</a:tableStyleId>
+              </a:tblPr>
+              <a:tblGrid>
+                <a:gridCol w="1502229">
+                  <a:extLst>
+                    <a:ext uri="{9D8B030D-6E8A-4147-A177-3AD203B41FA5}">
+                      <a16:colId xmlns:a16="http://schemas.microsoft.com/office/drawing/2014/main" val="36796140"/>
+                    </a:ext>
+                  </a:extLst>
+                </a:gridCol>
+                <a:gridCol w="1502229">
+                  <a:extLst>
+                    <a:ext uri="{9D8B030D-6E8A-4147-A177-3AD203B41FA5}">
+                      <a16:colId xmlns:a16="http://schemas.microsoft.com/office/drawing/2014/main" val="465893353"/>
+                    </a:ext>
+                  </a:extLst>
+                </a:gridCol>
+                <a:gridCol w="1502229">
+                  <a:extLst>
+                    <a:ext uri="{9D8B030D-6E8A-4147-A177-3AD203B41FA5}">
+                      <a16:colId xmlns:a16="http://schemas.microsoft.com/office/drawing/2014/main" val="2153789574"/>
+                    </a:ext>
+                  </a:extLst>
+                </a:gridCol>
+                <a:gridCol w="1502229">
+                  <a:extLst>
+                    <a:ext uri="{9D8B030D-6E8A-4147-A177-3AD203B41FA5}">
+                      <a16:colId xmlns:a16="http://schemas.microsoft.com/office/drawing/2014/main" val="84697164"/>
+                    </a:ext>
+                  </a:extLst>
+                </a:gridCol>
+                <a:gridCol w="1502229">
+                  <a:extLst>
+                    <a:ext uri="{9D8B030D-6E8A-4147-A177-3AD203B41FA5}">
+                      <a16:colId xmlns:a16="http://schemas.microsoft.com/office/drawing/2014/main" val="735214634"/>
+                    </a:ext>
+                  </a:extLst>
+                </a:gridCol>
+                <a:gridCol w="1502229">
+                  <a:extLst>
+                    <a:ext uri="{9D8B030D-6E8A-4147-A177-3AD203B41FA5}">
+                      <a16:colId xmlns:a16="http://schemas.microsoft.com/office/drawing/2014/main" val="2877017212"/>
+                    </a:ext>
+                  </a:extLst>
+                </a:gridCol>
+                <a:gridCol w="1502229">
+                  <a:extLst>
+                    <a:ext uri="{9D8B030D-6E8A-4147-A177-3AD203B41FA5}">
+                      <a16:colId xmlns:a16="http://schemas.microsoft.com/office/drawing/2014/main" val="4172139166"/>
+                    </a:ext>
+                  </a:extLst>
+                </a:gridCol>
+              </a:tblGrid>
+              <a:tr h="370840">
+                <a:tc>
+                  <a:txBody>
+                    <a:bodyPr/>
+                    <a:lstStyle/>
+                    <a:p>
+                      <a:endParaRPr lang="en-US" dirty="0"/>
+                    </a:p>
+                  </a:txBody>
+                  <a:tcPr/>
+                </a:tc>
+                <a:tc>
+                  <a:txBody>
+                    <a:bodyPr/>
+                    <a:lstStyle/>
+                    <a:p>
+                      <a:r>
+                        <a:rPr lang="en-US" dirty="0"/>
+                        <a:t>Ne</a:t>
+                      </a:r>
+                    </a:p>
+                  </a:txBody>
+                  <a:tcPr/>
+                </a:tc>
+                <a:tc>
+                  <a:txBody>
+                    <a:bodyPr/>
+                    <a:lstStyle/>
+                    <a:p>
+                      <a:r>
+                        <a:rPr lang="en-US" dirty="0"/>
+                        <a:t>Migration rate</a:t>
+                      </a:r>
+                    </a:p>
+                  </a:txBody>
+                  <a:tcPr/>
+                </a:tc>
+                <a:tc>
+                  <a:txBody>
+                    <a:bodyPr/>
+                    <a:lstStyle/>
+                    <a:p>
+                      <a:r>
+                        <a:rPr lang="en-US" sz="1600" dirty="0"/>
+                        <a:t>Minor allele </a:t>
+                      </a:r>
+                      <a:r>
+                        <a:rPr lang="en-US" sz="1600" dirty="0" err="1"/>
+                        <a:t>freq</a:t>
+                      </a:r>
+                      <a:endParaRPr lang="en-US" sz="1600" dirty="0"/>
+                    </a:p>
+                  </a:txBody>
+                  <a:tcPr/>
+                </a:tc>
+                <a:tc>
+                  <a:txBody>
+                    <a:bodyPr/>
+                    <a:lstStyle/>
+                    <a:p>
+                      <a:r>
+                        <a:rPr lang="en-US" dirty="0"/>
+                        <a:t>Growth rate (r0)</a:t>
+                      </a:r>
+                    </a:p>
+                  </a:txBody>
+                  <a:tcPr/>
+                </a:tc>
+                <a:tc>
+                  <a:txBody>
+                    <a:bodyPr/>
+                    <a:lstStyle/>
+                    <a:p>
+                      <a:r>
+                        <a:rPr lang="en-US" dirty="0"/>
+                        <a:t>Lifespan</a:t>
+                      </a:r>
+                    </a:p>
+                  </a:txBody>
+                  <a:tcPr/>
+                </a:tc>
+                <a:tc>
+                  <a:txBody>
+                    <a:bodyPr/>
+                    <a:lstStyle/>
+                    <a:p>
+                      <a:r>
+                        <a:rPr lang="en-US" dirty="0"/>
+                        <a:t>Fecundity</a:t>
+                      </a:r>
+                    </a:p>
+                  </a:txBody>
+                  <a:tcPr/>
+                </a:tc>
+                <a:extLst>
+                  <a:ext uri="{0D108BD9-81ED-4DB2-BD59-A6C34878D82A}">
+                    <a16:rowId xmlns:a16="http://schemas.microsoft.com/office/drawing/2014/main" val="640327661"/>
+                  </a:ext>
+                </a:extLst>
+              </a:tr>
+              <a:tr h="370840">
+                <a:tc>
+                  <a:txBody>
+                    <a:bodyPr/>
+                    <a:lstStyle/>
+                    <a:p>
+                      <a:endParaRPr lang="en-US" sz="1400" dirty="0"/>
+                    </a:p>
+                  </a:txBody>
+                  <a:tcPr>
+                    <a:solidFill>
+                      <a:schemeClr val="accent6">
+                        <a:lumMod val="40000"/>
+                        <a:lumOff val="60000"/>
+                      </a:schemeClr>
+                    </a:solidFill>
+                  </a:tcPr>
+                </a:tc>
+                <a:tc>
+                  <a:txBody>
+                    <a:bodyPr/>
+                    <a:lstStyle/>
+                    <a:p>
+                      <a:r>
+                        <a:rPr lang="en-US" sz="1400" dirty="0"/>
+                        <a:t>75, 100, 300, 500, 700</a:t>
+                      </a:r>
+                    </a:p>
+                  </a:txBody>
+                  <a:tcPr>
+                    <a:solidFill>
+                      <a:schemeClr val="accent6">
+                        <a:lumMod val="40000"/>
+                        <a:lumOff val="60000"/>
+                      </a:schemeClr>
+                    </a:solidFill>
+                  </a:tcPr>
+                </a:tc>
+                <a:tc>
+                  <a:txBody>
+                    <a:bodyPr/>
+                    <a:lstStyle/>
+                    <a:p>
+                      <a:r>
+                        <a:rPr lang="en-US" sz="1400" dirty="0"/>
+                        <a:t>0, "a"=one </a:t>
+                      </a:r>
+                      <a:r>
+                        <a:rPr lang="en-US" sz="1400" dirty="0" err="1"/>
+                        <a:t>mig</a:t>
+                      </a:r>
+                      <a:r>
+                        <a:rPr lang="en-US" sz="1400" dirty="0"/>
+                        <a:t> per gen, "b"=1xof50@175, "c"=3xpf25@175|201|225</a:t>
+                      </a:r>
+                    </a:p>
+                  </a:txBody>
+                  <a:tcPr>
+                    <a:solidFill>
+                      <a:schemeClr val="accent6">
+                        <a:lumMod val="40000"/>
+                        <a:lumOff val="60000"/>
+                      </a:schemeClr>
+                    </a:solidFill>
+                  </a:tcPr>
+                </a:tc>
+                <a:tc>
+                  <a:txBody>
+                    <a:bodyPr/>
+                    <a:lstStyle/>
+                    <a:p>
+                      <a:r>
+                        <a:rPr lang="en-US" sz="1400" dirty="0"/>
+                        <a:t>0.45, 0.07</a:t>
+                      </a:r>
+                    </a:p>
+                  </a:txBody>
+                  <a:tcPr>
+                    <a:solidFill>
+                      <a:schemeClr val="accent6">
+                        <a:lumMod val="40000"/>
+                        <a:lumOff val="60000"/>
+                      </a:schemeClr>
+                    </a:solidFill>
+                  </a:tcPr>
+                </a:tc>
+                <a:tc>
+                  <a:txBody>
+                    <a:bodyPr/>
+                    <a:lstStyle/>
+                    <a:p>
+                      <a:r>
+                        <a:rPr lang="en-US" sz="1400" dirty="0"/>
+                        <a:t>1, 0.5, 0.1</a:t>
+                      </a:r>
+                    </a:p>
+                  </a:txBody>
+                  <a:tcPr>
+                    <a:solidFill>
+                      <a:schemeClr val="accent6">
+                        <a:lumMod val="40000"/>
+                        <a:lumOff val="60000"/>
+                      </a:schemeClr>
+                    </a:solidFill>
+                  </a:tcPr>
+                </a:tc>
+                <a:tc>
+                  <a:txBody>
+                    <a:bodyPr/>
+                    <a:lstStyle/>
+                    <a:p>
+                      <a:r>
+                        <a:rPr lang="en-US" sz="1400" dirty="0"/>
+                        <a:t>3, 9, 15</a:t>
+                      </a:r>
+                    </a:p>
+                  </a:txBody>
+                  <a:tcPr>
+                    <a:solidFill>
+                      <a:schemeClr val="accent6">
+                        <a:lumMod val="40000"/>
+                        <a:lumOff val="60000"/>
+                      </a:schemeClr>
+                    </a:solidFill>
+                  </a:tcPr>
+                </a:tc>
+                <a:tc>
+                  <a:txBody>
+                    <a:bodyPr/>
+                    <a:lstStyle/>
+                    <a:p>
+                      <a:r>
+                        <a:rPr lang="en-US" sz="1400" dirty="0"/>
+                        <a:t>2, 4, 6</a:t>
+                      </a:r>
+                    </a:p>
+                  </a:txBody>
+                  <a:tcPr>
+                    <a:solidFill>
+                      <a:schemeClr val="accent6">
+                        <a:lumMod val="40000"/>
+                        <a:lumOff val="60000"/>
+                      </a:schemeClr>
+                    </a:solidFill>
+                  </a:tcPr>
+                </a:tc>
+                <a:extLst>
+                  <a:ext uri="{0D108BD9-81ED-4DB2-BD59-A6C34878D82A}">
+                    <a16:rowId xmlns:a16="http://schemas.microsoft.com/office/drawing/2014/main" val="724898931"/>
+                  </a:ext>
+                </a:extLst>
+              </a:tr>
+              <a:tr h="370840">
+                <a:tc>
+                  <a:txBody>
+                    <a:bodyPr/>
+                    <a:lstStyle/>
+                    <a:p>
+                      <a:pPr algn="l" fontAlgn="b"/>
+                      <a:r>
+                        <a:rPr lang="en-US" sz="1100" b="0" i="0" u="none" strike="noStrike" dirty="0">
+                          <a:solidFill>
+                            <a:srgbClr val="000000"/>
+                          </a:solidFill>
+                          <a:effectLst/>
+                          <a:latin typeface="Calibri" panose="020F0502020204030204" pitchFamily="34" charset="0"/>
+                        </a:rPr>
+                        <a:t>ABM_run.1.5.23_A</a:t>
+                      </a:r>
+                    </a:p>
+                  </a:txBody>
+                  <a:tcPr marL="0" marR="0" marT="0" marB="0" anchor="b"/>
+                </a:tc>
+                <a:tc>
+                  <a:txBody>
+                    <a:bodyPr/>
+                    <a:lstStyle/>
+                    <a:p>
+                      <a:pPr algn="r" fontAlgn="b"/>
+                      <a:r>
+                        <a:rPr lang="en-US" sz="1100" b="0" i="0" u="none" strike="noStrike" dirty="0">
+                          <a:solidFill>
+                            <a:srgbClr val="7030A0"/>
+                          </a:solidFill>
+                          <a:effectLst/>
+                          <a:latin typeface="Calibri" panose="020F0502020204030204" pitchFamily="34" charset="0"/>
+                        </a:rPr>
+                        <a:t>300</a:t>
+                      </a:r>
+                    </a:p>
+                  </a:txBody>
+                  <a:tcPr marL="0" marR="0" marT="0" marB="0" anchor="b"/>
+                </a:tc>
+                <a:tc>
+                  <a:txBody>
+                    <a:bodyPr/>
+                    <a:lstStyle/>
+                    <a:p>
+                      <a:r>
+                        <a:rPr lang="en-US" sz="1100" dirty="0"/>
+                        <a:t>0</a:t>
+                      </a:r>
+                    </a:p>
+                  </a:txBody>
+                  <a:tcPr/>
+                </a:tc>
+                <a:tc>
+                  <a:txBody>
+                    <a:bodyPr/>
+                    <a:lstStyle/>
+                    <a:p>
+                      <a:pPr marL="0" marR="0" lvl="0" indent="0" algn="l" defTabSz="914400" rtl="0" eaLnBrk="1" fontAlgn="auto" latinLnBrk="0" hangingPunct="1">
+                        <a:lnSpc>
+                          <a:spcPct val="100000"/>
+                        </a:lnSpc>
+                        <a:spcBef>
+                          <a:spcPts val="0"/>
+                        </a:spcBef>
+                        <a:spcAft>
+                          <a:spcPts val="0"/>
+                        </a:spcAft>
+                        <a:buClrTx/>
+                        <a:buSzTx/>
+                        <a:buFontTx/>
+                        <a:buNone/>
+                        <a:tabLst/>
+                        <a:defRPr/>
+                      </a:pPr>
+                      <a:r>
+                        <a:rPr lang="en-US" sz="1100" dirty="0"/>
+                        <a:t>0.45</a:t>
+                      </a:r>
+                    </a:p>
+                  </a:txBody>
+                  <a:tcPr/>
+                </a:tc>
+                <a:tc>
+                  <a:txBody>
+                    <a:bodyPr/>
+                    <a:lstStyle/>
+                    <a:p>
+                      <a:pPr algn="r" fontAlgn="b"/>
+                      <a:r>
+                        <a:rPr lang="en-US" sz="1100" b="0" i="0" u="none" strike="noStrike" dirty="0">
+                          <a:solidFill>
+                            <a:srgbClr val="000000"/>
+                          </a:solidFill>
+                          <a:effectLst/>
+                          <a:latin typeface="Calibri" panose="020F0502020204030204" pitchFamily="34" charset="0"/>
+                        </a:rPr>
+                        <a:t>1</a:t>
+                      </a:r>
+                    </a:p>
+                  </a:txBody>
+                  <a:tcPr marL="0" marR="0" marT="0" marB="0" anchor="b"/>
+                </a:tc>
+                <a:tc>
+                  <a:txBody>
+                    <a:bodyPr/>
+                    <a:lstStyle/>
+                    <a:p>
+                      <a:r>
+                        <a:rPr lang="en-US" sz="1100" dirty="0"/>
+                        <a:t>9</a:t>
+                      </a:r>
+                    </a:p>
+                  </a:txBody>
+                  <a:tcPr/>
+                </a:tc>
+                <a:tc>
+                  <a:txBody>
+                    <a:bodyPr/>
+                    <a:lstStyle/>
+                    <a:p>
+                      <a:r>
+                        <a:rPr lang="en-US" sz="1100" dirty="0"/>
+                        <a:t>2</a:t>
+                      </a:r>
+                    </a:p>
+                  </a:txBody>
+                  <a:tcPr/>
+                </a:tc>
+                <a:extLst>
+                  <a:ext uri="{0D108BD9-81ED-4DB2-BD59-A6C34878D82A}">
+                    <a16:rowId xmlns:a16="http://schemas.microsoft.com/office/drawing/2014/main" val="1849552592"/>
+                  </a:ext>
+                </a:extLst>
+              </a:tr>
+              <a:tr h="370840">
+                <a:tc>
+                  <a:txBody>
+                    <a:bodyPr/>
+                    <a:lstStyle/>
+                    <a:p>
+                      <a:pPr algn="l" fontAlgn="b"/>
+                      <a:r>
+                        <a:rPr lang="en-US" sz="1100" b="0" i="0" u="none" strike="noStrike">
+                          <a:solidFill>
+                            <a:srgbClr val="000000"/>
+                          </a:solidFill>
+                          <a:effectLst/>
+                          <a:latin typeface="Calibri" panose="020F0502020204030204" pitchFamily="34" charset="0"/>
+                        </a:rPr>
+                        <a:t>ABM_run.1.11.23_B</a:t>
+                      </a:r>
+                    </a:p>
+                  </a:txBody>
+                  <a:tcPr marL="0" marR="0" marT="0" marB="0" anchor="b"/>
+                </a:tc>
+                <a:tc>
+                  <a:txBody>
+                    <a:bodyPr/>
+                    <a:lstStyle/>
+                    <a:p>
+                      <a:pPr algn="r" fontAlgn="b"/>
+                      <a:r>
+                        <a:rPr lang="en-US" sz="1100" b="0" i="0" u="none" strike="noStrike">
+                          <a:solidFill>
+                            <a:srgbClr val="7030A0"/>
+                          </a:solidFill>
+                          <a:effectLst/>
+                          <a:latin typeface="Calibri" panose="020F0502020204030204" pitchFamily="34" charset="0"/>
+                        </a:rPr>
+                        <a:t>500</a:t>
+                      </a:r>
+                    </a:p>
+                  </a:txBody>
+                  <a:tcPr marL="0" marR="0" marT="0" marB="0" anchor="b"/>
+                </a:tc>
+                <a:tc>
+                  <a:txBody>
+                    <a:bodyPr/>
+                    <a:lstStyle/>
+                    <a:p>
+                      <a:r>
+                        <a:rPr lang="en-US" sz="1100" dirty="0"/>
+                        <a:t>0</a:t>
+                      </a:r>
+                    </a:p>
+                  </a:txBody>
+                  <a:tcPr/>
+                </a:tc>
+                <a:tc>
+                  <a:txBody>
+                    <a:bodyPr/>
+                    <a:lstStyle/>
+                    <a:p>
+                      <a:pPr marL="0" marR="0" lvl="0" indent="0" algn="l" defTabSz="914400" rtl="0" eaLnBrk="1" fontAlgn="auto" latinLnBrk="0" hangingPunct="1">
+                        <a:lnSpc>
+                          <a:spcPct val="100000"/>
+                        </a:lnSpc>
+                        <a:spcBef>
+                          <a:spcPts val="0"/>
+                        </a:spcBef>
+                        <a:spcAft>
+                          <a:spcPts val="0"/>
+                        </a:spcAft>
+                        <a:buClrTx/>
+                        <a:buSzTx/>
+                        <a:buFontTx/>
+                        <a:buNone/>
+                        <a:tabLst/>
+                        <a:defRPr/>
+                      </a:pPr>
+                      <a:r>
+                        <a:rPr kumimoji="0" lang="en-US" sz="1100" b="0" i="0" u="none" strike="noStrike" kern="1200" cap="none" spc="0" normalizeH="0" baseline="0" noProof="0" dirty="0">
+                          <a:ln>
+                            <a:noFill/>
+                          </a:ln>
+                          <a:solidFill>
+                            <a:prstClr val="black"/>
+                          </a:solidFill>
+                          <a:effectLst/>
+                          <a:uLnTx/>
+                          <a:uFillTx/>
+                          <a:latin typeface="+mn-lt"/>
+                          <a:ea typeface="+mn-ea"/>
+                          <a:cs typeface="+mn-cs"/>
+                        </a:rPr>
+                        <a:t>0.45</a:t>
+                      </a:r>
+                    </a:p>
+                  </a:txBody>
+                  <a:tcPr/>
+                </a:tc>
+                <a:tc>
+                  <a:txBody>
+                    <a:bodyPr/>
+                    <a:lstStyle/>
+                    <a:p>
+                      <a:pPr algn="r" fontAlgn="b"/>
+                      <a:r>
+                        <a:rPr lang="en-US" sz="1100" b="0" i="0" u="none" strike="noStrike">
+                          <a:solidFill>
+                            <a:srgbClr val="000000"/>
+                          </a:solidFill>
+                          <a:effectLst/>
+                          <a:latin typeface="Calibri" panose="020F0502020204030204" pitchFamily="34" charset="0"/>
+                        </a:rPr>
+                        <a:t>1</a:t>
+                      </a:r>
+                    </a:p>
+                  </a:txBody>
+                  <a:tcPr marL="0" marR="0" marT="0" marB="0" anchor="b"/>
+                </a:tc>
+                <a:tc>
+                  <a:txBody>
+                    <a:bodyPr/>
+                    <a:lstStyle/>
+                    <a:p>
+                      <a:r>
+                        <a:rPr lang="en-US" sz="1100" dirty="0"/>
+                        <a:t>9</a:t>
+                      </a:r>
+                    </a:p>
+                  </a:txBody>
+                  <a:tcPr/>
+                </a:tc>
+                <a:tc>
+                  <a:txBody>
+                    <a:bodyPr/>
+                    <a:lstStyle/>
+                    <a:p>
+                      <a:r>
+                        <a:rPr lang="en-US" sz="1100" dirty="0"/>
+                        <a:t>2</a:t>
+                      </a:r>
+                    </a:p>
+                  </a:txBody>
+                  <a:tcPr/>
+                </a:tc>
+                <a:extLst>
+                  <a:ext uri="{0D108BD9-81ED-4DB2-BD59-A6C34878D82A}">
+                    <a16:rowId xmlns:a16="http://schemas.microsoft.com/office/drawing/2014/main" val="1092630376"/>
+                  </a:ext>
+                </a:extLst>
+              </a:tr>
+              <a:tr h="370840">
+                <a:tc>
+                  <a:txBody>
+                    <a:bodyPr/>
+                    <a:lstStyle/>
+                    <a:p>
+                      <a:pPr algn="l" fontAlgn="b"/>
+                      <a:r>
+                        <a:rPr lang="en-US" sz="1100" b="0" i="0" u="none" strike="noStrike">
+                          <a:solidFill>
+                            <a:srgbClr val="000000"/>
+                          </a:solidFill>
+                          <a:effectLst/>
+                          <a:latin typeface="Calibri" panose="020F0502020204030204" pitchFamily="34" charset="0"/>
+                        </a:rPr>
+                        <a:t>ABM_run.1.11.23_C</a:t>
+                      </a:r>
+                    </a:p>
+                  </a:txBody>
+                  <a:tcPr marL="0" marR="0" marT="0" marB="0" anchor="b"/>
+                </a:tc>
+                <a:tc>
+                  <a:txBody>
+                    <a:bodyPr/>
+                    <a:lstStyle/>
+                    <a:p>
+                      <a:pPr algn="r" fontAlgn="b"/>
+                      <a:r>
+                        <a:rPr lang="en-US" sz="1100" b="0" i="0" u="none" strike="noStrike">
+                          <a:solidFill>
+                            <a:srgbClr val="7030A0"/>
+                          </a:solidFill>
+                          <a:effectLst/>
+                          <a:latin typeface="Calibri" panose="020F0502020204030204" pitchFamily="34" charset="0"/>
+                        </a:rPr>
+                        <a:t>700</a:t>
+                      </a:r>
+                    </a:p>
+                  </a:txBody>
+                  <a:tcPr marL="0" marR="0" marT="0" marB="0" anchor="b"/>
+                </a:tc>
+                <a:tc>
+                  <a:txBody>
+                    <a:bodyPr/>
+                    <a:lstStyle/>
+                    <a:p>
+                      <a:r>
+                        <a:rPr lang="en-US" sz="1100" dirty="0"/>
+                        <a:t>0</a:t>
+                      </a:r>
+                    </a:p>
+                  </a:txBody>
+                  <a:tcPr/>
+                </a:tc>
+                <a:tc>
+                  <a:txBody>
+                    <a:bodyPr/>
+                    <a:lstStyle/>
+                    <a:p>
+                      <a:pPr marL="0" marR="0" lvl="0" indent="0" algn="l" defTabSz="914400" rtl="0" eaLnBrk="1" fontAlgn="auto" latinLnBrk="0" hangingPunct="1">
+                        <a:lnSpc>
+                          <a:spcPct val="100000"/>
+                        </a:lnSpc>
+                        <a:spcBef>
+                          <a:spcPts val="0"/>
+                        </a:spcBef>
+                        <a:spcAft>
+                          <a:spcPts val="0"/>
+                        </a:spcAft>
+                        <a:buClrTx/>
+                        <a:buSzTx/>
+                        <a:buFontTx/>
+                        <a:buNone/>
+                        <a:tabLst/>
+                        <a:defRPr/>
+                      </a:pPr>
+                      <a:r>
+                        <a:rPr lang="en-US" sz="1100" dirty="0"/>
+                        <a:t>0.45</a:t>
+                      </a:r>
+                    </a:p>
+                  </a:txBody>
+                  <a:tcPr/>
+                </a:tc>
+                <a:tc>
+                  <a:txBody>
+                    <a:bodyPr/>
+                    <a:lstStyle/>
+                    <a:p>
+                      <a:pPr algn="r" fontAlgn="b"/>
+                      <a:r>
+                        <a:rPr lang="en-US" sz="1100" b="0" i="0" u="none" strike="noStrike">
+                          <a:solidFill>
+                            <a:srgbClr val="000000"/>
+                          </a:solidFill>
+                          <a:effectLst/>
+                          <a:latin typeface="Calibri" panose="020F0502020204030204" pitchFamily="34" charset="0"/>
+                        </a:rPr>
+                        <a:t>1</a:t>
+                      </a:r>
+                    </a:p>
+                  </a:txBody>
+                  <a:tcPr marL="0" marR="0" marT="0" marB="0" anchor="b"/>
+                </a:tc>
+                <a:tc>
+                  <a:txBody>
+                    <a:bodyPr/>
+                    <a:lstStyle/>
+                    <a:p>
+                      <a:r>
+                        <a:rPr lang="en-US" sz="1100" dirty="0"/>
+                        <a:t>9</a:t>
+                      </a:r>
+                    </a:p>
+                  </a:txBody>
+                  <a:tcPr/>
+                </a:tc>
+                <a:tc>
+                  <a:txBody>
+                    <a:bodyPr/>
+                    <a:lstStyle/>
+                    <a:p>
+                      <a:r>
+                        <a:rPr lang="en-US" sz="1100" dirty="0"/>
+                        <a:t>2</a:t>
+                      </a:r>
+                    </a:p>
+                  </a:txBody>
+                  <a:tcPr/>
+                </a:tc>
+                <a:extLst>
+                  <a:ext uri="{0D108BD9-81ED-4DB2-BD59-A6C34878D82A}">
+                    <a16:rowId xmlns:a16="http://schemas.microsoft.com/office/drawing/2014/main" val="1487313018"/>
+                  </a:ext>
+                </a:extLst>
+              </a:tr>
+              <a:tr h="370840">
+                <a:tc>
+                  <a:txBody>
+                    <a:bodyPr/>
+                    <a:lstStyle/>
+                    <a:p>
+                      <a:pPr algn="l" fontAlgn="b"/>
+                      <a:r>
+                        <a:rPr lang="en-US" sz="1100" b="0" i="0" u="none" strike="noStrike">
+                          <a:solidFill>
+                            <a:srgbClr val="000000"/>
+                          </a:solidFill>
+                          <a:effectLst/>
+                          <a:latin typeface="Calibri" panose="020F0502020204030204" pitchFamily="34" charset="0"/>
+                        </a:rPr>
+                        <a:t>ABM_run.1.9.23_D</a:t>
+                      </a:r>
+                    </a:p>
+                  </a:txBody>
+                  <a:tcPr marL="0" marR="0" marT="0" marB="0" anchor="b"/>
+                </a:tc>
+                <a:tc>
+                  <a:txBody>
+                    <a:bodyPr/>
+                    <a:lstStyle/>
+                    <a:p>
+                      <a:pPr algn="r" fontAlgn="b"/>
+                      <a:r>
+                        <a:rPr lang="en-US" sz="1100" b="0" i="0" u="none" strike="noStrike">
+                          <a:solidFill>
+                            <a:srgbClr val="7030A0"/>
+                          </a:solidFill>
+                          <a:effectLst/>
+                          <a:latin typeface="Calibri" panose="020F0502020204030204" pitchFamily="34" charset="0"/>
+                        </a:rPr>
+                        <a:t>100</a:t>
+                      </a:r>
+                    </a:p>
+                  </a:txBody>
+                  <a:tcPr marL="0" marR="0" marT="0" marB="0" anchor="b"/>
+                </a:tc>
+                <a:tc>
+                  <a:txBody>
+                    <a:bodyPr/>
+                    <a:lstStyle/>
+                    <a:p>
+                      <a:r>
+                        <a:rPr lang="en-US" sz="1100" dirty="0"/>
+                        <a:t>0</a:t>
+                      </a:r>
+                    </a:p>
+                  </a:txBody>
+                  <a:tcPr/>
+                </a:tc>
+                <a:tc>
+                  <a:txBody>
+                    <a:bodyPr/>
+                    <a:lstStyle/>
+                    <a:p>
+                      <a:pPr marL="0" marR="0" lvl="0" indent="0" algn="l" defTabSz="914400" rtl="0" eaLnBrk="1" fontAlgn="auto" latinLnBrk="0" hangingPunct="1">
+                        <a:lnSpc>
+                          <a:spcPct val="100000"/>
+                        </a:lnSpc>
+                        <a:spcBef>
+                          <a:spcPts val="0"/>
+                        </a:spcBef>
+                        <a:spcAft>
+                          <a:spcPts val="0"/>
+                        </a:spcAft>
+                        <a:buClrTx/>
+                        <a:buSzTx/>
+                        <a:buFontTx/>
+                        <a:buNone/>
+                        <a:tabLst/>
+                        <a:defRPr/>
+                      </a:pPr>
+                      <a:r>
+                        <a:rPr kumimoji="0" lang="en-US" sz="1100" b="0" i="0" u="none" strike="noStrike" kern="1200" cap="none" spc="0" normalizeH="0" baseline="0" noProof="0" dirty="0">
+                          <a:ln>
+                            <a:noFill/>
+                          </a:ln>
+                          <a:solidFill>
+                            <a:prstClr val="black"/>
+                          </a:solidFill>
+                          <a:effectLst/>
+                          <a:uLnTx/>
+                          <a:uFillTx/>
+                          <a:latin typeface="+mn-lt"/>
+                          <a:ea typeface="+mn-ea"/>
+                          <a:cs typeface="+mn-cs"/>
+                        </a:rPr>
+                        <a:t>0.45</a:t>
+                      </a:r>
+                    </a:p>
+                  </a:txBody>
+                  <a:tcPr/>
+                </a:tc>
+                <a:tc>
+                  <a:txBody>
+                    <a:bodyPr/>
+                    <a:lstStyle/>
+                    <a:p>
+                      <a:pPr algn="r" fontAlgn="b"/>
+                      <a:r>
+                        <a:rPr lang="en-US" sz="1100" b="0" i="0" u="none" strike="noStrike">
+                          <a:solidFill>
+                            <a:srgbClr val="000000"/>
+                          </a:solidFill>
+                          <a:effectLst/>
+                          <a:latin typeface="Calibri" panose="020F0502020204030204" pitchFamily="34" charset="0"/>
+                        </a:rPr>
+                        <a:t>1</a:t>
+                      </a:r>
+                    </a:p>
+                  </a:txBody>
+                  <a:tcPr marL="0" marR="0" marT="0" marB="0" anchor="b"/>
+                </a:tc>
+                <a:tc>
+                  <a:txBody>
+                    <a:bodyPr/>
+                    <a:lstStyle/>
+                    <a:p>
+                      <a:r>
+                        <a:rPr lang="en-US" sz="1100" dirty="0"/>
+                        <a:t>9</a:t>
+                      </a:r>
+                    </a:p>
+                  </a:txBody>
+                  <a:tcPr/>
+                </a:tc>
+                <a:tc>
+                  <a:txBody>
+                    <a:bodyPr/>
+                    <a:lstStyle/>
+                    <a:p>
+                      <a:r>
+                        <a:rPr lang="en-US" sz="1100" dirty="0"/>
+                        <a:t>2</a:t>
+                      </a:r>
+                    </a:p>
+                  </a:txBody>
+                  <a:tcPr/>
+                </a:tc>
+                <a:extLst>
+                  <a:ext uri="{0D108BD9-81ED-4DB2-BD59-A6C34878D82A}">
+                    <a16:rowId xmlns:a16="http://schemas.microsoft.com/office/drawing/2014/main" val="695656984"/>
+                  </a:ext>
+                </a:extLst>
+              </a:tr>
+              <a:tr h="370840">
+                <a:tc>
+                  <a:txBody>
+                    <a:bodyPr/>
+                    <a:lstStyle/>
+                    <a:p>
+                      <a:pPr algn="l" fontAlgn="b"/>
+                      <a:r>
+                        <a:rPr lang="en-US" sz="1100" b="0" i="0" u="none" strike="noStrike" dirty="0">
+                          <a:solidFill>
+                            <a:srgbClr val="000000"/>
+                          </a:solidFill>
+                          <a:effectLst/>
+                          <a:latin typeface="Calibri" panose="020F0502020204030204" pitchFamily="34" charset="0"/>
+                        </a:rPr>
+                        <a:t>ABM_run.1.11.23_E</a:t>
+                      </a:r>
+                    </a:p>
+                  </a:txBody>
+                  <a:tcPr marL="0" marR="0" marT="0" marB="0" anchor="b"/>
+                </a:tc>
+                <a:tc>
+                  <a:txBody>
+                    <a:bodyPr/>
+                    <a:lstStyle/>
+                    <a:p>
+                      <a:pPr algn="r" fontAlgn="b"/>
+                      <a:r>
+                        <a:rPr lang="en-US" sz="1100" b="0" i="0" u="none" strike="noStrike" dirty="0">
+                          <a:solidFill>
+                            <a:srgbClr val="7030A0"/>
+                          </a:solidFill>
+                          <a:effectLst/>
+                          <a:latin typeface="Calibri" panose="020F0502020204030204" pitchFamily="34" charset="0"/>
+                        </a:rPr>
+                        <a:t>75</a:t>
+                      </a:r>
+                    </a:p>
+                  </a:txBody>
+                  <a:tcPr marL="0" marR="0" marT="0" marB="0" anchor="b"/>
+                </a:tc>
+                <a:tc>
+                  <a:txBody>
+                    <a:bodyPr/>
+                    <a:lstStyle/>
+                    <a:p>
+                      <a:r>
+                        <a:rPr lang="en-US" sz="1100" dirty="0"/>
+                        <a:t>0</a:t>
+                      </a:r>
+                    </a:p>
+                  </a:txBody>
+                  <a:tcPr/>
+                </a:tc>
+                <a:tc>
+                  <a:txBody>
+                    <a:bodyPr/>
+                    <a:lstStyle/>
+                    <a:p>
+                      <a:pPr marL="0" marR="0" lvl="0" indent="0" algn="l" defTabSz="914400" rtl="0" eaLnBrk="1" fontAlgn="auto" latinLnBrk="0" hangingPunct="1">
+                        <a:lnSpc>
+                          <a:spcPct val="100000"/>
+                        </a:lnSpc>
+                        <a:spcBef>
+                          <a:spcPts val="0"/>
+                        </a:spcBef>
+                        <a:spcAft>
+                          <a:spcPts val="0"/>
+                        </a:spcAft>
+                        <a:buClrTx/>
+                        <a:buSzTx/>
+                        <a:buFontTx/>
+                        <a:buNone/>
+                        <a:tabLst/>
+                        <a:defRPr/>
+                      </a:pPr>
+                      <a:r>
+                        <a:rPr lang="en-US" sz="1100" dirty="0"/>
+                        <a:t>0.45</a:t>
+                      </a:r>
+                    </a:p>
+                  </a:txBody>
+                  <a:tcPr/>
+                </a:tc>
+                <a:tc>
+                  <a:txBody>
+                    <a:bodyPr/>
+                    <a:lstStyle/>
+                    <a:p>
+                      <a:pPr algn="l" fontAlgn="b"/>
+                      <a:r>
+                        <a:rPr lang="en-US" sz="1100" b="0" i="0" u="none" strike="noStrike" dirty="0">
+                          <a:solidFill>
+                            <a:srgbClr val="000000"/>
+                          </a:solidFill>
+                          <a:effectLst/>
+                          <a:latin typeface="Calibri" panose="020F0502020204030204" pitchFamily="34" charset="0"/>
+                        </a:rPr>
+                        <a:t>1</a:t>
+                      </a:r>
+                    </a:p>
+                  </a:txBody>
+                  <a:tcPr marL="0" marR="0" marT="0" marB="0" anchor="b"/>
+                </a:tc>
+                <a:tc>
+                  <a:txBody>
+                    <a:bodyPr/>
+                    <a:lstStyle/>
+                    <a:p>
+                      <a:r>
+                        <a:rPr lang="en-US" sz="1100" dirty="0"/>
+                        <a:t>9</a:t>
+                      </a:r>
+                    </a:p>
+                  </a:txBody>
+                  <a:tcPr/>
+                </a:tc>
+                <a:tc>
+                  <a:txBody>
+                    <a:bodyPr/>
+                    <a:lstStyle/>
+                    <a:p>
+                      <a:r>
+                        <a:rPr lang="en-US" sz="1100" dirty="0"/>
+                        <a:t>2</a:t>
+                      </a:r>
+                    </a:p>
+                  </a:txBody>
+                  <a:tcPr/>
+                </a:tc>
+                <a:extLst>
+                  <a:ext uri="{0D108BD9-81ED-4DB2-BD59-A6C34878D82A}">
+                    <a16:rowId xmlns:a16="http://schemas.microsoft.com/office/drawing/2014/main" val="2937712162"/>
+                  </a:ext>
+                </a:extLst>
+              </a:tr>
+              <a:tr h="370840">
+                <a:tc>
+                  <a:txBody>
+                    <a:bodyPr/>
+                    <a:lstStyle/>
+                    <a:p>
+                      <a:pPr algn="l" fontAlgn="b"/>
+                      <a:r>
+                        <a:rPr lang="en-US" sz="1100" b="0" i="0" u="none" strike="noStrike" dirty="0">
+                          <a:solidFill>
+                            <a:srgbClr val="000000"/>
+                          </a:solidFill>
+                          <a:effectLst/>
+                          <a:latin typeface="Calibri" panose="020F0502020204030204" pitchFamily="34" charset="0"/>
+                        </a:rPr>
+                        <a:t>ABM_run.1.18.23_a</a:t>
+                      </a:r>
+                    </a:p>
+                  </a:txBody>
+                  <a:tcPr marL="0" marR="0" marT="0" marB="0" anchor="b"/>
+                </a:tc>
+                <a:tc>
+                  <a:txBody>
+                    <a:bodyPr/>
+                    <a:lstStyle/>
+                    <a:p>
+                      <a:pPr algn="r" fontAlgn="b"/>
+                      <a:r>
+                        <a:rPr lang="en-US" sz="1100" b="0" i="0" u="none" strike="noStrike" dirty="0">
+                          <a:solidFill>
+                            <a:srgbClr val="7030A0"/>
+                          </a:solidFill>
+                          <a:effectLst/>
+                          <a:latin typeface="Calibri" panose="020F0502020204030204" pitchFamily="34" charset="0"/>
+                        </a:rPr>
+                        <a:t>100</a:t>
+                      </a:r>
+                    </a:p>
+                  </a:txBody>
+                  <a:tcPr marL="0" marR="0" marT="0" marB="0" anchor="b"/>
+                </a:tc>
+                <a:tc>
+                  <a:txBody>
+                    <a:bodyPr/>
+                    <a:lstStyle/>
+                    <a:p>
+                      <a:r>
+                        <a:rPr lang="en-US" sz="1100" dirty="0"/>
+                        <a:t>0</a:t>
+                      </a:r>
+                    </a:p>
+                  </a:txBody>
+                  <a:tcPr/>
+                </a:tc>
+                <a:tc>
+                  <a:txBody>
+                    <a:bodyPr/>
+                    <a:lstStyle/>
+                    <a:p>
+                      <a:pPr marL="0" marR="0" lvl="0" indent="0" algn="l" defTabSz="914400" rtl="0" eaLnBrk="1" fontAlgn="auto" latinLnBrk="0" hangingPunct="1">
+                        <a:lnSpc>
+                          <a:spcPct val="100000"/>
+                        </a:lnSpc>
+                        <a:spcBef>
+                          <a:spcPts val="0"/>
+                        </a:spcBef>
+                        <a:spcAft>
+                          <a:spcPts val="0"/>
+                        </a:spcAft>
+                        <a:buClrTx/>
+                        <a:buSzTx/>
+                        <a:buFontTx/>
+                        <a:buNone/>
+                        <a:tabLst/>
+                        <a:defRPr/>
+                      </a:pPr>
+                      <a:r>
+                        <a:rPr kumimoji="0" lang="en-US" sz="1100" b="0" i="0" u="none" strike="noStrike" kern="1200" cap="none" spc="0" normalizeH="0" baseline="0" noProof="0" dirty="0">
+                          <a:ln>
+                            <a:noFill/>
+                          </a:ln>
+                          <a:solidFill>
+                            <a:prstClr val="black"/>
+                          </a:solidFill>
+                          <a:effectLst/>
+                          <a:uLnTx/>
+                          <a:uFillTx/>
+                          <a:latin typeface="+mn-lt"/>
+                          <a:ea typeface="+mn-ea"/>
+                          <a:cs typeface="+mn-cs"/>
+                        </a:rPr>
+                        <a:t>0.45</a:t>
+                      </a:r>
+                    </a:p>
+                  </a:txBody>
+                  <a:tcPr/>
+                </a:tc>
+                <a:tc>
+                  <a:txBody>
+                    <a:bodyPr/>
+                    <a:lstStyle/>
+                    <a:p>
+                      <a:pPr algn="r" fontAlgn="b"/>
+                      <a:r>
+                        <a:rPr lang="en-US" sz="1100" b="0" i="0" u="none" strike="noStrike" dirty="0">
+                          <a:solidFill>
+                            <a:srgbClr val="000000"/>
+                          </a:solidFill>
+                          <a:effectLst/>
+                          <a:latin typeface="Calibri" panose="020F0502020204030204" pitchFamily="34" charset="0"/>
+                        </a:rPr>
+                        <a:t>1</a:t>
+                      </a:r>
+                    </a:p>
+                  </a:txBody>
+                  <a:tcPr marL="0" marR="0" marT="0" marB="0" anchor="b"/>
+                </a:tc>
+                <a:tc>
+                  <a:txBody>
+                    <a:bodyPr/>
+                    <a:lstStyle/>
+                    <a:p>
+                      <a:r>
+                        <a:rPr lang="en-US" sz="1100" dirty="0"/>
+                        <a:t>3</a:t>
+                      </a:r>
+                    </a:p>
+                  </a:txBody>
+                  <a:tcPr/>
+                </a:tc>
+                <a:tc>
+                  <a:txBody>
+                    <a:bodyPr/>
+                    <a:lstStyle/>
+                    <a:p>
+                      <a:r>
+                        <a:rPr lang="en-US" sz="1100" dirty="0"/>
+                        <a:t>4</a:t>
+                      </a:r>
+                    </a:p>
+                  </a:txBody>
+                  <a:tcPr/>
+                </a:tc>
+                <a:extLst>
+                  <a:ext uri="{0D108BD9-81ED-4DB2-BD59-A6C34878D82A}">
+                    <a16:rowId xmlns:a16="http://schemas.microsoft.com/office/drawing/2014/main" val="3618788274"/>
+                  </a:ext>
+                </a:extLst>
+              </a:tr>
+              <a:tr h="370840">
+                <a:tc>
+                  <a:txBody>
+                    <a:bodyPr/>
+                    <a:lstStyle/>
+                    <a:p>
+                      <a:pPr algn="l" fontAlgn="b"/>
+                      <a:r>
+                        <a:rPr lang="en-US" sz="1100" b="0" i="0" u="none" strike="noStrike">
+                          <a:solidFill>
+                            <a:srgbClr val="000000"/>
+                          </a:solidFill>
+                          <a:effectLst/>
+                          <a:latin typeface="Calibri" panose="020F0502020204030204" pitchFamily="34" charset="0"/>
+                        </a:rPr>
+                        <a:t>ABM_run.1.18.23_b</a:t>
+                      </a:r>
+                    </a:p>
+                  </a:txBody>
+                  <a:tcPr marL="0" marR="0" marT="0" marB="0" anchor="b"/>
+                </a:tc>
+                <a:tc>
+                  <a:txBody>
+                    <a:bodyPr/>
+                    <a:lstStyle/>
+                    <a:p>
+                      <a:pPr algn="r" fontAlgn="b"/>
+                      <a:r>
+                        <a:rPr lang="en-US" sz="1100" b="0" i="0" u="none" strike="noStrike">
+                          <a:solidFill>
+                            <a:srgbClr val="7030A0"/>
+                          </a:solidFill>
+                          <a:effectLst/>
+                          <a:latin typeface="Calibri" panose="020F0502020204030204" pitchFamily="34" charset="0"/>
+                        </a:rPr>
+                        <a:t>500</a:t>
+                      </a:r>
+                    </a:p>
+                  </a:txBody>
+                  <a:tcPr marL="0" marR="0" marT="0" marB="0" anchor="b"/>
+                </a:tc>
+                <a:tc>
+                  <a:txBody>
+                    <a:bodyPr/>
+                    <a:lstStyle/>
+                    <a:p>
+                      <a:r>
+                        <a:rPr lang="en-US" sz="1100" dirty="0"/>
+                        <a:t>0</a:t>
+                      </a:r>
+                    </a:p>
+                  </a:txBody>
+                  <a:tcPr/>
+                </a:tc>
+                <a:tc>
+                  <a:txBody>
+                    <a:bodyPr/>
+                    <a:lstStyle/>
+                    <a:p>
+                      <a:pPr marL="0" marR="0" lvl="0" indent="0" algn="l" defTabSz="914400" rtl="0" eaLnBrk="1" fontAlgn="auto" latinLnBrk="0" hangingPunct="1">
+                        <a:lnSpc>
+                          <a:spcPct val="100000"/>
+                        </a:lnSpc>
+                        <a:spcBef>
+                          <a:spcPts val="0"/>
+                        </a:spcBef>
+                        <a:spcAft>
+                          <a:spcPts val="0"/>
+                        </a:spcAft>
+                        <a:buClrTx/>
+                        <a:buSzTx/>
+                        <a:buFontTx/>
+                        <a:buNone/>
+                        <a:tabLst/>
+                        <a:defRPr/>
+                      </a:pPr>
+                      <a:r>
+                        <a:rPr lang="en-US" sz="1100" dirty="0"/>
+                        <a:t>0.45</a:t>
+                      </a:r>
+                    </a:p>
+                  </a:txBody>
+                  <a:tcPr/>
+                </a:tc>
+                <a:tc>
+                  <a:txBody>
+                    <a:bodyPr/>
+                    <a:lstStyle/>
+                    <a:p>
+                      <a:pPr algn="r" fontAlgn="b"/>
+                      <a:r>
+                        <a:rPr lang="en-US" sz="1100" b="0" i="0" u="none" strike="noStrike" dirty="0">
+                          <a:solidFill>
+                            <a:srgbClr val="000000"/>
+                          </a:solidFill>
+                          <a:effectLst/>
+                          <a:latin typeface="Calibri" panose="020F0502020204030204" pitchFamily="34" charset="0"/>
+                        </a:rPr>
+                        <a:t>1</a:t>
+                      </a:r>
+                    </a:p>
+                  </a:txBody>
+                  <a:tcPr marL="0" marR="0" marT="0" marB="0" anchor="b"/>
+                </a:tc>
+                <a:tc>
+                  <a:txBody>
+                    <a:bodyPr/>
+                    <a:lstStyle/>
+                    <a:p>
+                      <a:r>
+                        <a:rPr lang="en-US" sz="1100" dirty="0"/>
+                        <a:t>3</a:t>
+                      </a:r>
+                    </a:p>
+                  </a:txBody>
+                  <a:tcPr/>
+                </a:tc>
+                <a:tc>
+                  <a:txBody>
+                    <a:bodyPr/>
+                    <a:lstStyle/>
+                    <a:p>
+                      <a:r>
+                        <a:rPr lang="en-US" sz="1100" dirty="0"/>
+                        <a:t>4</a:t>
+                      </a:r>
+                    </a:p>
+                  </a:txBody>
+                  <a:tcPr/>
+                </a:tc>
+                <a:extLst>
+                  <a:ext uri="{0D108BD9-81ED-4DB2-BD59-A6C34878D82A}">
+                    <a16:rowId xmlns:a16="http://schemas.microsoft.com/office/drawing/2014/main" val="3215957644"/>
+                  </a:ext>
+                </a:extLst>
+              </a:tr>
+              <a:tr h="370840">
+                <a:tc>
+                  <a:txBody>
+                    <a:bodyPr/>
+                    <a:lstStyle/>
+                    <a:p>
+                      <a:pPr algn="l" fontAlgn="b"/>
+                      <a:r>
+                        <a:rPr lang="en-US" sz="1100" b="0" i="0" u="none" strike="noStrike" dirty="0">
+                          <a:solidFill>
+                            <a:srgbClr val="000000"/>
+                          </a:solidFill>
+                          <a:effectLst/>
+                          <a:latin typeface="Calibri" panose="020F0502020204030204" pitchFamily="34" charset="0"/>
+                        </a:rPr>
+                        <a:t>ABM_run.1.18.23_c</a:t>
+                      </a:r>
+                    </a:p>
+                  </a:txBody>
+                  <a:tcPr marL="0" marR="0" marT="0" marB="0" anchor="b"/>
+                </a:tc>
+                <a:tc>
+                  <a:txBody>
+                    <a:bodyPr/>
+                    <a:lstStyle/>
+                    <a:p>
+                      <a:pPr algn="r" fontAlgn="b"/>
+                      <a:r>
+                        <a:rPr lang="en-US" sz="1100" b="0" i="0" u="none" strike="noStrike">
+                          <a:solidFill>
+                            <a:srgbClr val="7030A0"/>
+                          </a:solidFill>
+                          <a:effectLst/>
+                          <a:latin typeface="Calibri" panose="020F0502020204030204" pitchFamily="34" charset="0"/>
+                        </a:rPr>
+                        <a:t>300</a:t>
+                      </a:r>
+                    </a:p>
+                  </a:txBody>
+                  <a:tcPr marL="0" marR="0" marT="0" marB="0" anchor="b"/>
+                </a:tc>
+                <a:tc>
+                  <a:txBody>
+                    <a:bodyPr/>
+                    <a:lstStyle/>
+                    <a:p>
+                      <a:r>
+                        <a:rPr lang="en-US" sz="1100" dirty="0"/>
+                        <a:t>0</a:t>
+                      </a:r>
+                    </a:p>
+                  </a:txBody>
+                  <a:tcPr/>
+                </a:tc>
+                <a:tc>
+                  <a:txBody>
+                    <a:bodyPr/>
+                    <a:lstStyle/>
+                    <a:p>
+                      <a:pPr marL="0" marR="0" lvl="0" indent="0" algn="l" defTabSz="914400" rtl="0" eaLnBrk="1" fontAlgn="auto" latinLnBrk="0" hangingPunct="1">
+                        <a:lnSpc>
+                          <a:spcPct val="100000"/>
+                        </a:lnSpc>
+                        <a:spcBef>
+                          <a:spcPts val="0"/>
+                        </a:spcBef>
+                        <a:spcAft>
+                          <a:spcPts val="0"/>
+                        </a:spcAft>
+                        <a:buClrTx/>
+                        <a:buSzTx/>
+                        <a:buFontTx/>
+                        <a:buNone/>
+                        <a:tabLst/>
+                        <a:defRPr/>
+                      </a:pPr>
+                      <a:r>
+                        <a:rPr lang="en-US" sz="1100" dirty="0"/>
+                        <a:t>0.45</a:t>
+                      </a:r>
+                    </a:p>
+                  </a:txBody>
+                  <a:tcPr/>
+                </a:tc>
+                <a:tc>
+                  <a:txBody>
+                    <a:bodyPr/>
+                    <a:lstStyle/>
+                    <a:p>
+                      <a:pPr algn="l" fontAlgn="b"/>
+                      <a:r>
+                        <a:rPr lang="en-US" sz="1100" b="0" i="0" u="none" strike="noStrike" dirty="0">
+                          <a:solidFill>
+                            <a:srgbClr val="000000"/>
+                          </a:solidFill>
+                          <a:effectLst/>
+                          <a:latin typeface="Calibri" panose="020F0502020204030204" pitchFamily="34" charset="0"/>
+                        </a:rPr>
+                        <a:t>0.5</a:t>
+                      </a:r>
+                    </a:p>
+                  </a:txBody>
+                  <a:tcPr marL="0" marR="0" marT="0" marB="0" anchor="b"/>
+                </a:tc>
+                <a:tc>
+                  <a:txBody>
+                    <a:bodyPr/>
+                    <a:lstStyle/>
+                    <a:p>
+                      <a:r>
+                        <a:rPr lang="en-US" sz="1100" dirty="0"/>
+                        <a:t>9</a:t>
+                      </a:r>
+                    </a:p>
+                  </a:txBody>
+                  <a:tcPr/>
+                </a:tc>
+                <a:tc>
+                  <a:txBody>
+                    <a:bodyPr/>
+                    <a:lstStyle/>
+                    <a:p>
+                      <a:r>
+                        <a:rPr lang="en-US" sz="1100" dirty="0"/>
+                        <a:t>4</a:t>
+                      </a:r>
+                    </a:p>
+                  </a:txBody>
+                  <a:tcPr/>
+                </a:tc>
+                <a:extLst>
+                  <a:ext uri="{0D108BD9-81ED-4DB2-BD59-A6C34878D82A}">
+                    <a16:rowId xmlns:a16="http://schemas.microsoft.com/office/drawing/2014/main" val="111650733"/>
+                  </a:ext>
+                </a:extLst>
+              </a:tr>
+              <a:tr h="370840">
+                <a:tc>
+                  <a:txBody>
+                    <a:bodyPr/>
+                    <a:lstStyle/>
+                    <a:p>
+                      <a:pPr algn="l" fontAlgn="b"/>
+                      <a:r>
+                        <a:rPr lang="en-US" sz="1100" b="0" i="0" u="none" strike="noStrike" dirty="0">
+                          <a:solidFill>
+                            <a:srgbClr val="000000"/>
+                          </a:solidFill>
+                          <a:effectLst/>
+                          <a:latin typeface="Calibri" panose="020F0502020204030204" pitchFamily="34" charset="0"/>
+                        </a:rPr>
+                        <a:t>ABM_run.1.18.23_d</a:t>
+                      </a:r>
+                    </a:p>
+                  </a:txBody>
+                  <a:tcPr marL="0" marR="0" marT="0" marB="0" anchor="b"/>
+                </a:tc>
+                <a:tc>
+                  <a:txBody>
+                    <a:bodyPr/>
+                    <a:lstStyle/>
+                    <a:p>
+                      <a:pPr algn="r" fontAlgn="b"/>
+                      <a:r>
+                        <a:rPr lang="en-US" sz="1100" b="0" i="0" u="none" strike="noStrike" dirty="0">
+                          <a:solidFill>
+                            <a:srgbClr val="7030A0"/>
+                          </a:solidFill>
+                          <a:effectLst/>
+                          <a:latin typeface="Calibri" panose="020F0502020204030204" pitchFamily="34" charset="0"/>
+                        </a:rPr>
+                        <a:t>300</a:t>
+                      </a:r>
+                    </a:p>
+                  </a:txBody>
+                  <a:tcPr marL="0" marR="0" marT="0" marB="0" anchor="b"/>
+                </a:tc>
+                <a:tc>
+                  <a:txBody>
+                    <a:bodyPr/>
+                    <a:lstStyle/>
+                    <a:p>
+                      <a:r>
+                        <a:rPr lang="en-US" sz="1100" dirty="0"/>
+                        <a:t>0</a:t>
+                      </a:r>
+                    </a:p>
+                  </a:txBody>
+                  <a:tcPr/>
+                </a:tc>
+                <a:tc>
+                  <a:txBody>
+                    <a:bodyPr/>
+                    <a:lstStyle/>
+                    <a:p>
+                      <a:pPr marL="0" marR="0" lvl="0" indent="0" algn="l" defTabSz="914400" rtl="0" eaLnBrk="1" fontAlgn="auto" latinLnBrk="0" hangingPunct="1">
+                        <a:lnSpc>
+                          <a:spcPct val="100000"/>
+                        </a:lnSpc>
+                        <a:spcBef>
+                          <a:spcPts val="0"/>
+                        </a:spcBef>
+                        <a:spcAft>
+                          <a:spcPts val="0"/>
+                        </a:spcAft>
+                        <a:buClrTx/>
+                        <a:buSzTx/>
+                        <a:buFontTx/>
+                        <a:buNone/>
+                        <a:tabLst/>
+                        <a:defRPr/>
+                      </a:pPr>
+                      <a:r>
+                        <a:rPr kumimoji="0" lang="en-US" sz="1100" b="0" i="0" u="none" strike="noStrike" kern="1200" cap="none" spc="0" normalizeH="0" baseline="0" noProof="0" dirty="0">
+                          <a:ln>
+                            <a:noFill/>
+                          </a:ln>
+                          <a:solidFill>
+                            <a:prstClr val="black"/>
+                          </a:solidFill>
+                          <a:effectLst/>
+                          <a:uLnTx/>
+                          <a:uFillTx/>
+                          <a:latin typeface="+mn-lt"/>
+                          <a:ea typeface="+mn-ea"/>
+                          <a:cs typeface="+mn-cs"/>
+                        </a:rPr>
+                        <a:t>0.45 </a:t>
+                      </a:r>
+                      <a:r>
+                        <a:rPr kumimoji="0" lang="en-US" sz="1100" b="0" i="0" u="none" strike="noStrike" kern="1200" cap="none" spc="0" normalizeH="0" baseline="0" noProof="0" dirty="0">
+                          <a:ln>
+                            <a:noFill/>
+                          </a:ln>
+                          <a:solidFill>
+                            <a:prstClr val="black"/>
+                          </a:solidFill>
+                          <a:effectLst/>
+                          <a:highlight>
+                            <a:srgbClr val="FFFF00"/>
+                          </a:highlight>
+                          <a:uLnTx/>
+                          <a:uFillTx/>
+                          <a:latin typeface="+mn-lt"/>
+                          <a:ea typeface="+mn-ea"/>
+                          <a:cs typeface="+mn-cs"/>
+                        </a:rPr>
+                        <a:t>**0.07 in focal pop</a:t>
+                      </a:r>
+                    </a:p>
+                  </a:txBody>
+                  <a:tcPr/>
+                </a:tc>
+                <a:tc>
+                  <a:txBody>
+                    <a:bodyPr/>
+                    <a:lstStyle/>
+                    <a:p>
+                      <a:pPr algn="r" fontAlgn="b"/>
+                      <a:r>
+                        <a:rPr lang="en-US" sz="1100" b="0" i="0" u="none" strike="noStrike" dirty="0">
+                          <a:solidFill>
+                            <a:srgbClr val="000000"/>
+                          </a:solidFill>
+                          <a:effectLst/>
+                          <a:latin typeface="Calibri" panose="020F0502020204030204" pitchFamily="34" charset="0"/>
+                        </a:rPr>
+                        <a:t>1</a:t>
+                      </a:r>
+                    </a:p>
+                  </a:txBody>
+                  <a:tcPr marL="0" marR="0" marT="0" marB="0" anchor="b"/>
+                </a:tc>
+                <a:tc>
+                  <a:txBody>
+                    <a:bodyPr/>
+                    <a:lstStyle/>
+                    <a:p>
+                      <a:r>
+                        <a:rPr lang="en-US" sz="1100" dirty="0"/>
+                        <a:t>9</a:t>
+                      </a:r>
+                    </a:p>
+                  </a:txBody>
+                  <a:tcPr/>
+                </a:tc>
+                <a:tc>
+                  <a:txBody>
+                    <a:bodyPr/>
+                    <a:lstStyle/>
+                    <a:p>
+                      <a:r>
+                        <a:rPr lang="en-US" sz="1100" dirty="0"/>
+                        <a:t>2</a:t>
+                      </a:r>
+                    </a:p>
+                  </a:txBody>
+                  <a:tcPr/>
+                </a:tc>
+                <a:extLst>
+                  <a:ext uri="{0D108BD9-81ED-4DB2-BD59-A6C34878D82A}">
+                    <a16:rowId xmlns:a16="http://schemas.microsoft.com/office/drawing/2014/main" val="3326773654"/>
+                  </a:ext>
+                </a:extLst>
+              </a:tr>
+            </a:tbl>
+          </a:graphicData>
+        </a:graphic>
+      </p:graphicFrame>
+    </p:spTree>
+    <p:extLst>
+      <p:ext uri="{BB962C8B-B14F-4D97-AF65-F5344CB8AC3E}">
+        <p14:creationId xmlns:p14="http://schemas.microsoft.com/office/powerpoint/2010/main" val="2802636343"/>
+      </p:ext>
+    </p:extLst>
+  </p:cSld>
+  <p:clrMapOvr>
+    <a:masterClrMapping/>
+  </p:clrMapOvr>
+</p:sld>
+</file>
+
+<file path=ppt/slides/slide22.xml><?xml version="1.0" encoding="utf-8"?>
+<p:sld xmlns:a="http://schemas.openxmlformats.org/drawingml/2006/main" xmlns:r="http://schemas.openxmlformats.org/officeDocument/2006/relationships" xmlns:p="http://schemas.openxmlformats.org/presentationml/2006/main">
+  <p:cSld>
+    <p:spTree>
+      <p:nvGrpSpPr>
+        <p:cNvPr id="1" name=""/>
+        <p:cNvGrpSpPr/>
+        <p:nvPr/>
+      </p:nvGrpSpPr>
+      <p:grpSpPr>
+        <a:xfrm>
+          <a:off x="0" y="0"/>
+          <a:ext cx="0" cy="0"/>
+          <a:chOff x="0" y="0"/>
+          <a:chExt cx="0" cy="0"/>
+        </a:xfrm>
+      </p:grpSpPr>
+      <p:sp>
+        <p:nvSpPr>
+          <p:cNvPr id="2" name="Title 1">
+            <a:extLst>
+              <a:ext uri="{FF2B5EF4-FFF2-40B4-BE49-F238E27FC236}">
+                <a16:creationId xmlns:a16="http://schemas.microsoft.com/office/drawing/2014/main" id="{1626DB6B-6699-B3C4-66E1-E4755C15C94C}"/>
+              </a:ext>
+            </a:extLst>
+          </p:cNvPr>
+          <p:cNvSpPr>
+            <a:spLocks noGrp="1"/>
+          </p:cNvSpPr>
+          <p:nvPr>
+            <p:ph type="title"/>
+          </p:nvPr>
+        </p:nvSpPr>
+        <p:spPr>
+          <a:xfrm>
+            <a:off x="838194" y="19431"/>
+            <a:ext cx="10515600" cy="585851"/>
+          </a:xfrm>
+        </p:spPr>
+        <p:txBody>
+          <a:bodyPr>
+            <a:normAutofit/>
+          </a:bodyPr>
+          <a:lstStyle/>
+          <a:p>
+            <a:r>
+              <a:rPr lang="en-US" sz="3200" dirty="0"/>
+              <a:t>Parameter Table</a:t>
+            </a:r>
+          </a:p>
+        </p:txBody>
+      </p:sp>
+      <p:graphicFrame>
+        <p:nvGraphicFramePr>
+          <p:cNvPr id="7" name="Table 7">
+            <a:extLst>
+              <a:ext uri="{FF2B5EF4-FFF2-40B4-BE49-F238E27FC236}">
+                <a16:creationId xmlns:a16="http://schemas.microsoft.com/office/drawing/2014/main" id="{5E1AAC85-5C8F-AE02-7341-09673470E4DE}"/>
+              </a:ext>
+            </a:extLst>
+          </p:cNvPr>
+          <p:cNvGraphicFramePr>
+            <a:graphicFrameLocks noGrp="1"/>
+          </p:cNvGraphicFramePr>
+          <p:nvPr>
+            <p:ph idx="1"/>
+            <p:extLst>
+              <p:ext uri="{D42A27DB-BD31-4B8C-83A1-F6EECF244321}">
+                <p14:modId xmlns:p14="http://schemas.microsoft.com/office/powerpoint/2010/main" val="459457319"/>
+              </p:ext>
+            </p:extLst>
+          </p:nvPr>
+        </p:nvGraphicFramePr>
+        <p:xfrm>
+          <a:off x="838194" y="819785"/>
+          <a:ext cx="10515603" cy="5191760"/>
+        </p:xfrm>
+        <a:graphic>
+          <a:graphicData uri="http://schemas.openxmlformats.org/drawingml/2006/table">
+            <a:tbl>
+              <a:tblPr firstRow="1" bandRow="1">
+                <a:tableStyleId>{5C22544A-7EE6-4342-B048-85BDC9FD1C3A}</a:tableStyleId>
+              </a:tblPr>
+              <a:tblGrid>
+                <a:gridCol w="1502229">
+                  <a:extLst>
+                    <a:ext uri="{9D8B030D-6E8A-4147-A177-3AD203B41FA5}">
+                      <a16:colId xmlns:a16="http://schemas.microsoft.com/office/drawing/2014/main" val="36796140"/>
+                    </a:ext>
+                  </a:extLst>
+                </a:gridCol>
+                <a:gridCol w="1502229">
+                  <a:extLst>
+                    <a:ext uri="{9D8B030D-6E8A-4147-A177-3AD203B41FA5}">
+                      <a16:colId xmlns:a16="http://schemas.microsoft.com/office/drawing/2014/main" val="465893353"/>
+                    </a:ext>
+                  </a:extLst>
+                </a:gridCol>
+                <a:gridCol w="1502229">
+                  <a:extLst>
+                    <a:ext uri="{9D8B030D-6E8A-4147-A177-3AD203B41FA5}">
+                      <a16:colId xmlns:a16="http://schemas.microsoft.com/office/drawing/2014/main" val="2153789574"/>
+                    </a:ext>
+                  </a:extLst>
+                </a:gridCol>
+                <a:gridCol w="1502229">
+                  <a:extLst>
+                    <a:ext uri="{9D8B030D-6E8A-4147-A177-3AD203B41FA5}">
+                      <a16:colId xmlns:a16="http://schemas.microsoft.com/office/drawing/2014/main" val="84697164"/>
+                    </a:ext>
+                  </a:extLst>
+                </a:gridCol>
+                <a:gridCol w="1502229">
+                  <a:extLst>
+                    <a:ext uri="{9D8B030D-6E8A-4147-A177-3AD203B41FA5}">
+                      <a16:colId xmlns:a16="http://schemas.microsoft.com/office/drawing/2014/main" val="735214634"/>
+                    </a:ext>
+                  </a:extLst>
+                </a:gridCol>
+                <a:gridCol w="1502229">
+                  <a:extLst>
+                    <a:ext uri="{9D8B030D-6E8A-4147-A177-3AD203B41FA5}">
+                      <a16:colId xmlns:a16="http://schemas.microsoft.com/office/drawing/2014/main" val="2877017212"/>
+                    </a:ext>
+                  </a:extLst>
+                </a:gridCol>
+                <a:gridCol w="1502229">
+                  <a:extLst>
+                    <a:ext uri="{9D8B030D-6E8A-4147-A177-3AD203B41FA5}">
+                      <a16:colId xmlns:a16="http://schemas.microsoft.com/office/drawing/2014/main" val="4172139166"/>
+                    </a:ext>
+                  </a:extLst>
+                </a:gridCol>
+              </a:tblGrid>
+              <a:tr h="370840">
+                <a:tc>
+                  <a:txBody>
+                    <a:bodyPr/>
+                    <a:lstStyle/>
+                    <a:p>
+                      <a:endParaRPr lang="en-US" dirty="0"/>
+                    </a:p>
+                  </a:txBody>
+                  <a:tcPr/>
+                </a:tc>
+                <a:tc>
+                  <a:txBody>
+                    <a:bodyPr/>
+                    <a:lstStyle/>
+                    <a:p>
+                      <a:r>
+                        <a:rPr lang="en-US" dirty="0"/>
+                        <a:t>Ne</a:t>
+                      </a:r>
+                    </a:p>
+                  </a:txBody>
+                  <a:tcPr/>
+                </a:tc>
+                <a:tc>
+                  <a:txBody>
+                    <a:bodyPr/>
+                    <a:lstStyle/>
+                    <a:p>
+                      <a:r>
+                        <a:rPr lang="en-US" dirty="0"/>
+                        <a:t>Migration rate</a:t>
+                      </a:r>
+                    </a:p>
+                  </a:txBody>
+                  <a:tcPr/>
+                </a:tc>
+                <a:tc>
+                  <a:txBody>
+                    <a:bodyPr/>
+                    <a:lstStyle/>
+                    <a:p>
+                      <a:r>
+                        <a:rPr lang="en-US" sz="1600" dirty="0"/>
+                        <a:t>Minor allele </a:t>
+                      </a:r>
+                      <a:r>
+                        <a:rPr lang="en-US" sz="1600" dirty="0" err="1"/>
+                        <a:t>freq</a:t>
+                      </a:r>
+                      <a:endParaRPr lang="en-US" sz="1600" dirty="0"/>
+                    </a:p>
+                  </a:txBody>
+                  <a:tcPr/>
+                </a:tc>
+                <a:tc>
+                  <a:txBody>
+                    <a:bodyPr/>
+                    <a:lstStyle/>
+                    <a:p>
+                      <a:r>
+                        <a:rPr lang="en-US" dirty="0"/>
+                        <a:t>Growth rate (r0)</a:t>
+                      </a:r>
+                    </a:p>
+                  </a:txBody>
+                  <a:tcPr/>
+                </a:tc>
+                <a:tc>
+                  <a:txBody>
+                    <a:bodyPr/>
+                    <a:lstStyle/>
+                    <a:p>
+                      <a:r>
+                        <a:rPr lang="en-US" dirty="0"/>
+                        <a:t>Lifespan</a:t>
+                      </a:r>
+                    </a:p>
+                  </a:txBody>
+                  <a:tcPr/>
+                </a:tc>
+                <a:tc>
+                  <a:txBody>
+                    <a:bodyPr/>
+                    <a:lstStyle/>
+                    <a:p>
+                      <a:r>
+                        <a:rPr lang="en-US" dirty="0"/>
+                        <a:t>Fecundity</a:t>
+                      </a:r>
+                    </a:p>
+                  </a:txBody>
+                  <a:tcPr/>
+                </a:tc>
+                <a:extLst>
+                  <a:ext uri="{0D108BD9-81ED-4DB2-BD59-A6C34878D82A}">
+                    <a16:rowId xmlns:a16="http://schemas.microsoft.com/office/drawing/2014/main" val="640327661"/>
+                  </a:ext>
+                </a:extLst>
+              </a:tr>
+              <a:tr h="370840">
+                <a:tc>
+                  <a:txBody>
+                    <a:bodyPr/>
+                    <a:lstStyle/>
+                    <a:p>
+                      <a:endParaRPr lang="en-US" sz="1400" dirty="0"/>
+                    </a:p>
+                  </a:txBody>
+                  <a:tcPr>
+                    <a:solidFill>
+                      <a:schemeClr val="accent6">
+                        <a:lumMod val="40000"/>
+                        <a:lumOff val="60000"/>
+                      </a:schemeClr>
+                    </a:solidFill>
+                  </a:tcPr>
+                </a:tc>
+                <a:tc>
+                  <a:txBody>
+                    <a:bodyPr/>
+                    <a:lstStyle/>
+                    <a:p>
+                      <a:r>
+                        <a:rPr lang="en-US" sz="1400" dirty="0"/>
+                        <a:t>75, 100, 300, 500, 700</a:t>
+                      </a:r>
+                    </a:p>
+                  </a:txBody>
+                  <a:tcPr>
+                    <a:solidFill>
+                      <a:schemeClr val="accent6">
+                        <a:lumMod val="40000"/>
+                        <a:lumOff val="60000"/>
+                      </a:schemeClr>
+                    </a:solidFill>
+                  </a:tcPr>
+                </a:tc>
+                <a:tc>
+                  <a:txBody>
+                    <a:bodyPr/>
+                    <a:lstStyle/>
+                    <a:p>
+                      <a:r>
+                        <a:rPr lang="en-US" sz="1400" dirty="0"/>
+                        <a:t>0, "a"=one </a:t>
+                      </a:r>
+                      <a:r>
+                        <a:rPr lang="en-US" sz="1400" dirty="0" err="1"/>
+                        <a:t>mig</a:t>
+                      </a:r>
+                      <a:r>
+                        <a:rPr lang="en-US" sz="1400" dirty="0"/>
+                        <a:t> per gen, "b"=1xof50@175, "c"=3xpf25@175|201|225</a:t>
+                      </a:r>
+                    </a:p>
+                  </a:txBody>
+                  <a:tcPr>
+                    <a:solidFill>
+                      <a:schemeClr val="accent6">
+                        <a:lumMod val="40000"/>
+                        <a:lumOff val="60000"/>
+                      </a:schemeClr>
+                    </a:solidFill>
+                  </a:tcPr>
+                </a:tc>
+                <a:tc>
+                  <a:txBody>
+                    <a:bodyPr/>
+                    <a:lstStyle/>
+                    <a:p>
+                      <a:r>
+                        <a:rPr lang="en-US" sz="1400" dirty="0"/>
+                        <a:t>0.45, 0.07</a:t>
+                      </a:r>
+                    </a:p>
+                  </a:txBody>
+                  <a:tcPr>
+                    <a:solidFill>
+                      <a:schemeClr val="accent6">
+                        <a:lumMod val="40000"/>
+                        <a:lumOff val="60000"/>
+                      </a:schemeClr>
+                    </a:solidFill>
+                  </a:tcPr>
+                </a:tc>
+                <a:tc>
+                  <a:txBody>
+                    <a:bodyPr/>
+                    <a:lstStyle/>
+                    <a:p>
+                      <a:r>
+                        <a:rPr lang="en-US" sz="1400" dirty="0"/>
+                        <a:t>1, 0.5, 0.1</a:t>
+                      </a:r>
+                    </a:p>
+                  </a:txBody>
+                  <a:tcPr>
+                    <a:solidFill>
+                      <a:schemeClr val="accent6">
+                        <a:lumMod val="40000"/>
+                        <a:lumOff val="60000"/>
+                      </a:schemeClr>
+                    </a:solidFill>
+                  </a:tcPr>
+                </a:tc>
+                <a:tc>
+                  <a:txBody>
+                    <a:bodyPr/>
+                    <a:lstStyle/>
+                    <a:p>
+                      <a:r>
+                        <a:rPr lang="en-US" sz="1400" dirty="0"/>
+                        <a:t>3, 9, 15</a:t>
+                      </a:r>
+                    </a:p>
+                  </a:txBody>
+                  <a:tcPr>
+                    <a:solidFill>
+                      <a:schemeClr val="accent6">
+                        <a:lumMod val="40000"/>
+                        <a:lumOff val="60000"/>
+                      </a:schemeClr>
+                    </a:solidFill>
+                  </a:tcPr>
+                </a:tc>
+                <a:tc>
+                  <a:txBody>
+                    <a:bodyPr/>
+                    <a:lstStyle/>
+                    <a:p>
+                      <a:r>
+                        <a:rPr lang="en-US" sz="1400" dirty="0"/>
+                        <a:t>2, 4, 6</a:t>
+                      </a:r>
+                    </a:p>
+                  </a:txBody>
+                  <a:tcPr>
+                    <a:solidFill>
+                      <a:schemeClr val="accent6">
+                        <a:lumMod val="40000"/>
+                        <a:lumOff val="60000"/>
+                      </a:schemeClr>
+                    </a:solidFill>
+                  </a:tcPr>
+                </a:tc>
+                <a:extLst>
+                  <a:ext uri="{0D108BD9-81ED-4DB2-BD59-A6C34878D82A}">
+                    <a16:rowId xmlns:a16="http://schemas.microsoft.com/office/drawing/2014/main" val="724898931"/>
+                  </a:ext>
+                </a:extLst>
+              </a:tr>
+              <a:tr h="370840">
+                <a:tc>
+                  <a:txBody>
+                    <a:bodyPr/>
+                    <a:lstStyle/>
+                    <a:p>
+                      <a:r>
+                        <a:rPr lang="en-US" dirty="0" err="1"/>
+                        <a:t>Run_a</a:t>
+                      </a:r>
+                      <a:endParaRPr lang="en-US" dirty="0"/>
+                    </a:p>
+                  </a:txBody>
+                  <a:tcPr/>
+                </a:tc>
+                <a:tc>
+                  <a:txBody>
+                    <a:bodyPr/>
+                    <a:lstStyle/>
+                    <a:p>
+                      <a:r>
+                        <a:rPr lang="en-US" dirty="0"/>
+                        <a:t>300</a:t>
+                      </a:r>
+                    </a:p>
+                  </a:txBody>
+                  <a:tcPr/>
+                </a:tc>
+                <a:tc>
+                  <a:txBody>
+                    <a:bodyPr/>
+                    <a:lstStyle/>
+                    <a:p>
+                      <a:r>
+                        <a:rPr lang="en-US" dirty="0"/>
+                        <a:t>all4</a:t>
+                      </a:r>
+                    </a:p>
+                  </a:txBody>
+                  <a:tcPr/>
+                </a:tc>
+                <a:tc>
+                  <a:txBody>
+                    <a:bodyPr/>
+                    <a:lstStyle/>
+                    <a:p>
+                      <a:r>
+                        <a:rPr lang="en-US" dirty="0"/>
+                        <a:t>0.07</a:t>
+                      </a:r>
+                    </a:p>
+                  </a:txBody>
+                  <a:tcPr/>
+                </a:tc>
+                <a:tc>
+                  <a:txBody>
+                    <a:bodyPr/>
+                    <a:lstStyle/>
+                    <a:p>
+                      <a:r>
+                        <a:rPr lang="en-US" dirty="0"/>
+                        <a:t>1</a:t>
+                      </a:r>
+                    </a:p>
+                  </a:txBody>
+                  <a:tcPr/>
+                </a:tc>
+                <a:tc>
+                  <a:txBody>
+                    <a:bodyPr/>
+                    <a:lstStyle/>
+                    <a:p>
+                      <a:r>
+                        <a:rPr lang="en-US" dirty="0"/>
+                        <a:t>9</a:t>
+                      </a:r>
+                    </a:p>
+                  </a:txBody>
+                  <a:tcPr/>
+                </a:tc>
+                <a:tc>
+                  <a:txBody>
+                    <a:bodyPr/>
+                    <a:lstStyle/>
+                    <a:p>
+                      <a:r>
+                        <a:rPr lang="en-US" dirty="0"/>
+                        <a:t>2</a:t>
+                      </a:r>
+                    </a:p>
+                  </a:txBody>
+                  <a:tcPr/>
+                </a:tc>
+                <a:extLst>
+                  <a:ext uri="{0D108BD9-81ED-4DB2-BD59-A6C34878D82A}">
+                    <a16:rowId xmlns:a16="http://schemas.microsoft.com/office/drawing/2014/main" val="1849552592"/>
+                  </a:ext>
+                </a:extLst>
+              </a:tr>
+              <a:tr h="370840">
+                <a:tc>
+                  <a:txBody>
+                    <a:bodyPr/>
+                    <a:lstStyle/>
+                    <a:p>
+                      <a:r>
+                        <a:rPr lang="en-US" dirty="0" err="1"/>
+                        <a:t>Run_b</a:t>
+                      </a:r>
+                      <a:endParaRPr lang="en-US" dirty="0"/>
+                    </a:p>
+                  </a:txBody>
+                  <a:tcPr/>
+                </a:tc>
+                <a:tc>
+                  <a:txBody>
+                    <a:bodyPr/>
+                    <a:lstStyle/>
+                    <a:p>
+                      <a:r>
+                        <a:rPr lang="en-US" dirty="0"/>
+                        <a:t>300</a:t>
+                      </a:r>
+                    </a:p>
+                  </a:txBody>
+                  <a:tcPr/>
+                </a:tc>
+                <a:tc>
+                  <a:txBody>
+                    <a:bodyPr/>
+                    <a:lstStyle/>
+                    <a:p>
+                      <a:r>
+                        <a:rPr lang="en-US" dirty="0"/>
+                        <a:t>All4</a:t>
+                      </a:r>
+                    </a:p>
+                  </a:txBody>
+                  <a:tcPr/>
+                </a:tc>
+                <a:tc>
+                  <a:txBody>
+                    <a:bodyPr/>
+                    <a:lstStyle/>
+                    <a:p>
+                      <a:r>
+                        <a:rPr lang="en-US" dirty="0"/>
+                        <a:t>0.45</a:t>
+                      </a:r>
+                    </a:p>
+                  </a:txBody>
+                  <a:tcPr/>
+                </a:tc>
+                <a:tc>
+                  <a:txBody>
+                    <a:bodyPr/>
+                    <a:lstStyle/>
+                    <a:p>
+                      <a:r>
+                        <a:rPr lang="en-US" dirty="0"/>
+                        <a:t>1</a:t>
+                      </a:r>
+                    </a:p>
+                  </a:txBody>
+                  <a:tcPr/>
+                </a:tc>
+                <a:tc>
+                  <a:txBody>
+                    <a:bodyPr/>
+                    <a:lstStyle/>
+                    <a:p>
+                      <a:r>
+                        <a:rPr lang="en-US" dirty="0"/>
+                        <a:t>15, 3</a:t>
+                      </a:r>
+                    </a:p>
+                  </a:txBody>
+                  <a:tcPr/>
+                </a:tc>
+                <a:tc>
+                  <a:txBody>
+                    <a:bodyPr/>
+                    <a:lstStyle/>
+                    <a:p>
+                      <a:r>
+                        <a:rPr lang="en-US" dirty="0"/>
+                        <a:t>2</a:t>
+                      </a:r>
+                    </a:p>
+                  </a:txBody>
+                  <a:tcPr/>
+                </a:tc>
+                <a:extLst>
+                  <a:ext uri="{0D108BD9-81ED-4DB2-BD59-A6C34878D82A}">
+                    <a16:rowId xmlns:a16="http://schemas.microsoft.com/office/drawing/2014/main" val="1092630376"/>
+                  </a:ext>
+                </a:extLst>
+              </a:tr>
+              <a:tr h="370840">
+                <a:tc>
+                  <a:txBody>
+                    <a:bodyPr/>
+                    <a:lstStyle/>
+                    <a:p>
+                      <a:r>
+                        <a:rPr lang="en-US" dirty="0" err="1"/>
+                        <a:t>Run_c</a:t>
+                      </a:r>
+                      <a:endParaRPr lang="en-US" dirty="0"/>
+                    </a:p>
+                  </a:txBody>
+                  <a:tcPr/>
+                </a:tc>
+                <a:tc>
+                  <a:txBody>
+                    <a:bodyPr/>
+                    <a:lstStyle/>
+                    <a:p>
+                      <a:r>
+                        <a:rPr lang="en-US" dirty="0"/>
+                        <a:t>300</a:t>
+                      </a:r>
+                    </a:p>
+                  </a:txBody>
+                  <a:tcPr/>
+                </a:tc>
+                <a:tc>
+                  <a:txBody>
+                    <a:bodyPr/>
+                    <a:lstStyle/>
+                    <a:p>
+                      <a:r>
+                        <a:rPr lang="en-US" dirty="0"/>
+                        <a:t>all4</a:t>
+                      </a:r>
+                    </a:p>
+                  </a:txBody>
+                  <a:tcPr/>
+                </a:tc>
+                <a:tc>
+                  <a:txBody>
+                    <a:bodyPr/>
+                    <a:lstStyle/>
+                    <a:p>
+                      <a:r>
+                        <a:rPr lang="en-US" dirty="0"/>
+                        <a:t>0.45</a:t>
+                      </a:r>
+                    </a:p>
+                  </a:txBody>
+                  <a:tcPr/>
+                </a:tc>
+                <a:tc>
+                  <a:txBody>
+                    <a:bodyPr/>
+                    <a:lstStyle/>
+                    <a:p>
+                      <a:r>
+                        <a:rPr lang="en-US" dirty="0"/>
+                        <a:t>1</a:t>
+                      </a:r>
+                    </a:p>
+                  </a:txBody>
+                  <a:tcPr/>
+                </a:tc>
+                <a:tc>
+                  <a:txBody>
+                    <a:bodyPr/>
+                    <a:lstStyle/>
+                    <a:p>
+                      <a:r>
+                        <a:rPr lang="en-US" dirty="0"/>
+                        <a:t>9</a:t>
+                      </a:r>
+                    </a:p>
+                  </a:txBody>
+                  <a:tcPr/>
+                </a:tc>
+                <a:tc>
+                  <a:txBody>
+                    <a:bodyPr/>
+                    <a:lstStyle/>
+                    <a:p>
+                      <a:r>
+                        <a:rPr lang="en-US" dirty="0"/>
+                        <a:t>4, 6</a:t>
+                      </a:r>
+                    </a:p>
+                  </a:txBody>
+                  <a:tcPr/>
+                </a:tc>
+                <a:extLst>
+                  <a:ext uri="{0D108BD9-81ED-4DB2-BD59-A6C34878D82A}">
+                    <a16:rowId xmlns:a16="http://schemas.microsoft.com/office/drawing/2014/main" val="1487313018"/>
+                  </a:ext>
+                </a:extLst>
+              </a:tr>
+              <a:tr h="370840">
+                <a:tc>
+                  <a:txBody>
+                    <a:bodyPr/>
+                    <a:lstStyle/>
+                    <a:p>
+                      <a:r>
+                        <a:rPr lang="en-US" dirty="0" err="1"/>
+                        <a:t>Run_d</a:t>
+                      </a:r>
+                      <a:endParaRPr lang="en-US" dirty="0"/>
+                    </a:p>
+                  </a:txBody>
+                  <a:tcPr/>
+                </a:tc>
+                <a:tc>
+                  <a:txBody>
+                    <a:bodyPr/>
+                    <a:lstStyle/>
+                    <a:p>
+                      <a:r>
+                        <a:rPr lang="en-US" dirty="0"/>
+                        <a:t>300</a:t>
+                      </a:r>
+                    </a:p>
+                  </a:txBody>
+                  <a:tcPr/>
+                </a:tc>
+                <a:tc>
+                  <a:txBody>
+                    <a:bodyPr/>
+                    <a:lstStyle/>
+                    <a:p>
+                      <a:r>
+                        <a:rPr lang="en-US" dirty="0"/>
+                        <a:t>all4</a:t>
+                      </a:r>
+                    </a:p>
+                  </a:txBody>
+                  <a:tcPr/>
+                </a:tc>
+                <a:tc>
+                  <a:txBody>
+                    <a:bodyPr/>
+                    <a:lstStyle/>
+                    <a:p>
+                      <a:r>
+                        <a:rPr lang="en-US" dirty="0"/>
+                        <a:t>0.45</a:t>
+                      </a:r>
+                    </a:p>
+                  </a:txBody>
+                  <a:tcPr/>
+                </a:tc>
+                <a:tc>
+                  <a:txBody>
+                    <a:bodyPr/>
+                    <a:lstStyle/>
+                    <a:p>
+                      <a:r>
+                        <a:rPr lang="en-US" dirty="0"/>
+                        <a:t>0.5</a:t>
+                      </a:r>
+                    </a:p>
+                  </a:txBody>
+                  <a:tcPr/>
+                </a:tc>
+                <a:tc>
+                  <a:txBody>
+                    <a:bodyPr/>
+                    <a:lstStyle/>
+                    <a:p>
+                      <a:r>
+                        <a:rPr lang="en-US" dirty="0"/>
+                        <a:t>9</a:t>
+                      </a:r>
+                    </a:p>
+                  </a:txBody>
+                  <a:tcPr/>
+                </a:tc>
+                <a:tc>
+                  <a:txBody>
+                    <a:bodyPr/>
+                    <a:lstStyle/>
+                    <a:p>
+                      <a:r>
+                        <a:rPr lang="en-US" dirty="0"/>
+                        <a:t>2</a:t>
+                      </a:r>
+                    </a:p>
+                  </a:txBody>
+                  <a:tcPr/>
+                </a:tc>
+                <a:extLst>
+                  <a:ext uri="{0D108BD9-81ED-4DB2-BD59-A6C34878D82A}">
+                    <a16:rowId xmlns:a16="http://schemas.microsoft.com/office/drawing/2014/main" val="2937712162"/>
+                  </a:ext>
+                </a:extLst>
+              </a:tr>
+              <a:tr h="370840">
+                <a:tc>
+                  <a:txBody>
+                    <a:bodyPr/>
+                    <a:lstStyle/>
+                    <a:p>
+                      <a:r>
+                        <a:rPr lang="en-US" dirty="0" err="1"/>
+                        <a:t>Run_e</a:t>
+                      </a:r>
+                      <a:endParaRPr lang="en-US" dirty="0"/>
+                    </a:p>
+                  </a:txBody>
+                  <a:tcPr/>
+                </a:tc>
+                <a:tc>
+                  <a:txBody>
+                    <a:bodyPr/>
+                    <a:lstStyle/>
+                    <a:p>
+                      <a:r>
+                        <a:rPr lang="en-US" dirty="0"/>
+                        <a:t>300</a:t>
+                      </a:r>
+                    </a:p>
+                  </a:txBody>
+                  <a:tcPr/>
+                </a:tc>
+                <a:tc>
+                  <a:txBody>
+                    <a:bodyPr/>
+                    <a:lstStyle/>
+                    <a:p>
+                      <a:r>
+                        <a:rPr lang="en-US" dirty="0"/>
+                        <a:t>A, b, c</a:t>
+                      </a:r>
+                    </a:p>
+                  </a:txBody>
+                  <a:tcPr/>
+                </a:tc>
+                <a:tc>
+                  <a:txBody>
+                    <a:bodyPr/>
+                    <a:lstStyle/>
+                    <a:p>
+                      <a:r>
+                        <a:rPr lang="en-US" dirty="0"/>
+                        <a:t>0.45</a:t>
+                      </a:r>
+                    </a:p>
+                  </a:txBody>
+                  <a:tcPr/>
+                </a:tc>
+                <a:tc>
+                  <a:txBody>
+                    <a:bodyPr/>
+                    <a:lstStyle/>
+                    <a:p>
+                      <a:r>
+                        <a:rPr lang="en-US" dirty="0"/>
+                        <a:t>1</a:t>
+                      </a:r>
+                    </a:p>
+                  </a:txBody>
+                  <a:tcPr/>
+                </a:tc>
+                <a:tc>
+                  <a:txBody>
+                    <a:bodyPr/>
+                    <a:lstStyle/>
+                    <a:p>
+                      <a:r>
+                        <a:rPr lang="en-US" dirty="0"/>
+                        <a:t>9</a:t>
+                      </a:r>
+                    </a:p>
+                  </a:txBody>
+                  <a:tcPr/>
+                </a:tc>
+                <a:tc>
+                  <a:txBody>
+                    <a:bodyPr/>
+                    <a:lstStyle/>
+                    <a:p>
+                      <a:r>
+                        <a:rPr lang="en-US" dirty="0"/>
+                        <a:t>2</a:t>
+                      </a:r>
+                    </a:p>
+                  </a:txBody>
+                  <a:tcPr/>
+                </a:tc>
+                <a:extLst>
+                  <a:ext uri="{0D108BD9-81ED-4DB2-BD59-A6C34878D82A}">
+                    <a16:rowId xmlns:a16="http://schemas.microsoft.com/office/drawing/2014/main" val="3618788274"/>
+                  </a:ext>
+                </a:extLst>
+              </a:tr>
+              <a:tr h="370840">
+                <a:tc>
+                  <a:txBody>
+                    <a:bodyPr/>
+                    <a:lstStyle/>
+                    <a:p>
+                      <a:endParaRPr lang="en-US" sz="1600" dirty="0"/>
+                    </a:p>
+                  </a:txBody>
+                  <a:tcPr>
+                    <a:solidFill>
+                      <a:schemeClr val="bg2">
+                        <a:lumMod val="50000"/>
+                      </a:schemeClr>
+                    </a:solidFill>
+                  </a:tcPr>
+                </a:tc>
+                <a:tc>
+                  <a:txBody>
+                    <a:bodyPr/>
+                    <a:lstStyle/>
+                    <a:p>
+                      <a:endParaRPr lang="en-US" dirty="0"/>
+                    </a:p>
+                  </a:txBody>
+                  <a:tcPr>
+                    <a:solidFill>
+                      <a:schemeClr val="bg2">
+                        <a:lumMod val="50000"/>
+                      </a:schemeClr>
+                    </a:solidFill>
+                  </a:tcPr>
+                </a:tc>
+                <a:tc>
+                  <a:txBody>
+                    <a:bodyPr/>
+                    <a:lstStyle/>
+                    <a:p>
+                      <a:endParaRPr lang="en-US" dirty="0"/>
+                    </a:p>
+                  </a:txBody>
+                  <a:tcPr>
+                    <a:solidFill>
+                      <a:schemeClr val="bg2">
+                        <a:lumMod val="50000"/>
+                      </a:schemeClr>
+                    </a:solidFill>
+                  </a:tcPr>
+                </a:tc>
+                <a:tc>
+                  <a:txBody>
+                    <a:bodyPr/>
+                    <a:lstStyle/>
+                    <a:p>
+                      <a:endParaRPr lang="en-US" dirty="0"/>
+                    </a:p>
+                  </a:txBody>
+                  <a:tcPr>
+                    <a:solidFill>
+                      <a:schemeClr val="bg2">
+                        <a:lumMod val="50000"/>
+                      </a:schemeClr>
+                    </a:solidFill>
+                  </a:tcPr>
+                </a:tc>
+                <a:tc>
+                  <a:txBody>
+                    <a:bodyPr/>
+                    <a:lstStyle/>
+                    <a:p>
+                      <a:endParaRPr lang="en-US" dirty="0"/>
+                    </a:p>
+                  </a:txBody>
+                  <a:tcPr>
+                    <a:solidFill>
+                      <a:schemeClr val="bg2">
+                        <a:lumMod val="50000"/>
+                      </a:schemeClr>
+                    </a:solidFill>
+                  </a:tcPr>
+                </a:tc>
+                <a:tc>
+                  <a:txBody>
+                    <a:bodyPr/>
+                    <a:lstStyle/>
+                    <a:p>
+                      <a:endParaRPr lang="en-US" dirty="0"/>
+                    </a:p>
+                  </a:txBody>
+                  <a:tcPr>
+                    <a:solidFill>
+                      <a:schemeClr val="bg2">
+                        <a:lumMod val="50000"/>
+                      </a:schemeClr>
+                    </a:solidFill>
+                  </a:tcPr>
+                </a:tc>
+                <a:tc>
+                  <a:txBody>
+                    <a:bodyPr/>
+                    <a:lstStyle/>
+                    <a:p>
+                      <a:endParaRPr lang="en-US" dirty="0"/>
+                    </a:p>
+                  </a:txBody>
+                  <a:tcPr>
+                    <a:solidFill>
+                      <a:schemeClr val="bg2">
+                        <a:lumMod val="50000"/>
+                      </a:schemeClr>
+                    </a:solidFill>
+                  </a:tcPr>
+                </a:tc>
+                <a:extLst>
+                  <a:ext uri="{0D108BD9-81ED-4DB2-BD59-A6C34878D82A}">
+                    <a16:rowId xmlns:a16="http://schemas.microsoft.com/office/drawing/2014/main" val="3215957644"/>
+                  </a:ext>
+                </a:extLst>
+              </a:tr>
+              <a:tr h="370840">
+                <a:tc>
+                  <a:txBody>
+                    <a:bodyPr/>
+                    <a:lstStyle/>
+                    <a:p>
+                      <a:pPr algn="l" fontAlgn="b"/>
+                      <a:r>
+                        <a:rPr lang="en-US" sz="1100" b="0" i="0" u="none" strike="noStrike" dirty="0">
+                          <a:solidFill>
+                            <a:srgbClr val="000000"/>
+                          </a:solidFill>
+                          <a:effectLst/>
+                          <a:latin typeface="Calibri" panose="020F0502020204030204" pitchFamily="34" charset="0"/>
+                        </a:rPr>
+                        <a:t>ABM_run.1.18.23_d</a:t>
+                      </a:r>
+                    </a:p>
+                  </a:txBody>
+                  <a:tcPr marL="0" marR="0" marT="0" marB="0" anchor="b"/>
+                </a:tc>
+                <a:tc>
+                  <a:txBody>
+                    <a:bodyPr/>
+                    <a:lstStyle/>
+                    <a:p>
+                      <a:pPr algn="r" fontAlgn="b"/>
+                      <a:r>
+                        <a:rPr lang="en-US" sz="1100" b="0" i="0" u="none" strike="noStrike" dirty="0">
+                          <a:solidFill>
+                            <a:srgbClr val="7030A0"/>
+                          </a:solidFill>
+                          <a:effectLst/>
+                          <a:latin typeface="Calibri" panose="020F0502020204030204" pitchFamily="34" charset="0"/>
+                        </a:rPr>
+                        <a:t>300</a:t>
+                      </a:r>
+                    </a:p>
+                  </a:txBody>
+                  <a:tcPr marL="0" marR="0" marT="0" marB="0" anchor="b"/>
+                </a:tc>
+                <a:tc>
+                  <a:txBody>
+                    <a:bodyPr/>
+                    <a:lstStyle/>
+                    <a:p>
+                      <a:r>
+                        <a:rPr lang="en-US" sz="1100" dirty="0"/>
+                        <a:t>0</a:t>
+                      </a:r>
+                    </a:p>
+                  </a:txBody>
+                  <a:tcPr/>
+                </a:tc>
+                <a:tc>
+                  <a:txBody>
+                    <a:bodyPr/>
+                    <a:lstStyle/>
+                    <a:p>
+                      <a:pPr marL="0" marR="0" lvl="0" indent="0" algn="l" defTabSz="914400" rtl="0" eaLnBrk="1" fontAlgn="auto" latinLnBrk="0" hangingPunct="1">
+                        <a:lnSpc>
+                          <a:spcPct val="100000"/>
+                        </a:lnSpc>
+                        <a:spcBef>
+                          <a:spcPts val="0"/>
+                        </a:spcBef>
+                        <a:spcAft>
+                          <a:spcPts val="0"/>
+                        </a:spcAft>
+                        <a:buClrTx/>
+                        <a:buSzTx/>
+                        <a:buFontTx/>
+                        <a:buNone/>
+                        <a:tabLst/>
+                        <a:defRPr/>
+                      </a:pPr>
+                      <a:r>
+                        <a:rPr kumimoji="0" lang="en-US" sz="1100" b="0" i="0" u="none" strike="noStrike" kern="1200" cap="none" spc="0" normalizeH="0" baseline="0" noProof="0" dirty="0">
+                          <a:ln>
+                            <a:noFill/>
+                          </a:ln>
+                          <a:solidFill>
+                            <a:prstClr val="black"/>
+                          </a:solidFill>
+                          <a:effectLst/>
+                          <a:uLnTx/>
+                          <a:uFillTx/>
+                          <a:latin typeface="+mn-lt"/>
+                          <a:ea typeface="+mn-ea"/>
+                          <a:cs typeface="+mn-cs"/>
+                        </a:rPr>
+                        <a:t>0.45 </a:t>
+                      </a:r>
+                      <a:r>
+                        <a:rPr kumimoji="0" lang="en-US" sz="1100" b="0" i="0" u="none" strike="noStrike" kern="1200" cap="none" spc="0" normalizeH="0" baseline="0" noProof="0" dirty="0">
+                          <a:ln>
+                            <a:noFill/>
+                          </a:ln>
+                          <a:solidFill>
+                            <a:prstClr val="black"/>
+                          </a:solidFill>
+                          <a:effectLst/>
+                          <a:highlight>
+                            <a:srgbClr val="FFFF00"/>
+                          </a:highlight>
+                          <a:uLnTx/>
+                          <a:uFillTx/>
+                          <a:latin typeface="+mn-lt"/>
+                          <a:ea typeface="+mn-ea"/>
+                          <a:cs typeface="+mn-cs"/>
+                        </a:rPr>
+                        <a:t>**0.07 in focal pop</a:t>
+                      </a:r>
+                    </a:p>
+                  </a:txBody>
+                  <a:tcPr/>
+                </a:tc>
+                <a:tc>
+                  <a:txBody>
+                    <a:bodyPr/>
+                    <a:lstStyle/>
+                    <a:p>
+                      <a:pPr algn="r" fontAlgn="b"/>
+                      <a:r>
+                        <a:rPr lang="en-US" sz="1100" b="0" i="0" u="none" strike="noStrike" dirty="0">
+                          <a:solidFill>
+                            <a:srgbClr val="000000"/>
+                          </a:solidFill>
+                          <a:effectLst/>
+                          <a:latin typeface="Calibri" panose="020F0502020204030204" pitchFamily="34" charset="0"/>
+                        </a:rPr>
+                        <a:t>1</a:t>
+                      </a:r>
+                    </a:p>
+                  </a:txBody>
+                  <a:tcPr marL="0" marR="0" marT="0" marB="0" anchor="b"/>
+                </a:tc>
+                <a:tc>
+                  <a:txBody>
+                    <a:bodyPr/>
+                    <a:lstStyle/>
+                    <a:p>
+                      <a:r>
+                        <a:rPr lang="en-US" sz="1100" dirty="0"/>
+                        <a:t>9</a:t>
+                      </a:r>
+                    </a:p>
+                  </a:txBody>
+                  <a:tcPr/>
+                </a:tc>
+                <a:tc>
+                  <a:txBody>
+                    <a:bodyPr/>
+                    <a:lstStyle/>
+                    <a:p>
+                      <a:r>
+                        <a:rPr lang="en-US" sz="1100" dirty="0"/>
+                        <a:t>2</a:t>
+                      </a:r>
+                    </a:p>
+                  </a:txBody>
+                  <a:tcPr/>
+                </a:tc>
+                <a:extLst>
+                  <a:ext uri="{0D108BD9-81ED-4DB2-BD59-A6C34878D82A}">
+                    <a16:rowId xmlns:a16="http://schemas.microsoft.com/office/drawing/2014/main" val="111650733"/>
+                  </a:ext>
+                </a:extLst>
+              </a:tr>
+              <a:tr h="370840">
+                <a:tc>
+                  <a:txBody>
+                    <a:bodyPr/>
+                    <a:lstStyle/>
+                    <a:p>
+                      <a:pPr algn="l" fontAlgn="b"/>
+                      <a:r>
+                        <a:rPr lang="en-US" sz="1100" b="0" i="0" u="none" strike="noStrike" dirty="0">
+                          <a:solidFill>
+                            <a:srgbClr val="000000"/>
+                          </a:solidFill>
+                          <a:effectLst/>
+                          <a:latin typeface="Calibri" panose="020F0502020204030204" pitchFamily="34" charset="0"/>
+                        </a:rPr>
+                        <a:t>ABM_run.1.18.23_c</a:t>
+                      </a:r>
+                    </a:p>
+                  </a:txBody>
+                  <a:tcPr marL="0" marR="0" marT="0" marB="0" anchor="b"/>
+                </a:tc>
+                <a:tc>
+                  <a:txBody>
+                    <a:bodyPr/>
+                    <a:lstStyle/>
+                    <a:p>
+                      <a:pPr algn="r" fontAlgn="b"/>
+                      <a:r>
+                        <a:rPr lang="en-US" sz="1100" b="0" i="0" u="none" strike="noStrike">
+                          <a:solidFill>
+                            <a:srgbClr val="7030A0"/>
+                          </a:solidFill>
+                          <a:effectLst/>
+                          <a:latin typeface="Calibri" panose="020F0502020204030204" pitchFamily="34" charset="0"/>
+                        </a:rPr>
+                        <a:t>300</a:t>
+                      </a:r>
+                    </a:p>
+                  </a:txBody>
+                  <a:tcPr marL="0" marR="0" marT="0" marB="0" anchor="b"/>
+                </a:tc>
+                <a:tc>
+                  <a:txBody>
+                    <a:bodyPr/>
+                    <a:lstStyle/>
+                    <a:p>
+                      <a:r>
+                        <a:rPr lang="en-US" sz="1100" dirty="0"/>
+                        <a:t>0</a:t>
+                      </a:r>
+                    </a:p>
+                  </a:txBody>
+                  <a:tcPr/>
+                </a:tc>
+                <a:tc>
+                  <a:txBody>
+                    <a:bodyPr/>
+                    <a:lstStyle/>
+                    <a:p>
+                      <a:pPr marL="0" marR="0" lvl="0" indent="0" algn="l" defTabSz="914400" rtl="0" eaLnBrk="1" fontAlgn="auto" latinLnBrk="0" hangingPunct="1">
+                        <a:lnSpc>
+                          <a:spcPct val="100000"/>
+                        </a:lnSpc>
+                        <a:spcBef>
+                          <a:spcPts val="0"/>
+                        </a:spcBef>
+                        <a:spcAft>
+                          <a:spcPts val="0"/>
+                        </a:spcAft>
+                        <a:buClrTx/>
+                        <a:buSzTx/>
+                        <a:buFontTx/>
+                        <a:buNone/>
+                        <a:tabLst/>
+                        <a:defRPr/>
+                      </a:pPr>
+                      <a:r>
+                        <a:rPr lang="en-US" sz="1100" dirty="0"/>
+                        <a:t>0.45</a:t>
+                      </a:r>
+                    </a:p>
+                  </a:txBody>
+                  <a:tcPr/>
+                </a:tc>
+                <a:tc>
+                  <a:txBody>
+                    <a:bodyPr/>
+                    <a:lstStyle/>
+                    <a:p>
+                      <a:pPr algn="l" fontAlgn="b"/>
+                      <a:r>
+                        <a:rPr lang="en-US" sz="1100" b="0" i="0" u="none" strike="noStrike" dirty="0">
+                          <a:solidFill>
+                            <a:srgbClr val="000000"/>
+                          </a:solidFill>
+                          <a:effectLst/>
+                          <a:latin typeface="Calibri" panose="020F0502020204030204" pitchFamily="34" charset="0"/>
+                        </a:rPr>
+                        <a:t>0.5</a:t>
+                      </a:r>
+                    </a:p>
+                  </a:txBody>
+                  <a:tcPr marL="0" marR="0" marT="0" marB="0" anchor="b"/>
+                </a:tc>
+                <a:tc>
+                  <a:txBody>
+                    <a:bodyPr/>
+                    <a:lstStyle/>
+                    <a:p>
+                      <a:r>
+                        <a:rPr lang="en-US" sz="1100" dirty="0"/>
+                        <a:t>9</a:t>
+                      </a:r>
+                    </a:p>
+                  </a:txBody>
+                  <a:tcPr/>
+                </a:tc>
+                <a:tc>
+                  <a:txBody>
+                    <a:bodyPr/>
+                    <a:lstStyle/>
+                    <a:p>
+                      <a:r>
+                        <a:rPr lang="en-US" sz="1100" dirty="0"/>
+                        <a:t>4</a:t>
+                      </a:r>
+                    </a:p>
+                  </a:txBody>
+                  <a:tcPr/>
+                </a:tc>
+                <a:extLst>
+                  <a:ext uri="{0D108BD9-81ED-4DB2-BD59-A6C34878D82A}">
+                    <a16:rowId xmlns:a16="http://schemas.microsoft.com/office/drawing/2014/main" val="3326773654"/>
+                  </a:ext>
+                </a:extLst>
+              </a:tr>
+              <a:tr h="370840">
+                <a:tc>
+                  <a:txBody>
+                    <a:bodyPr/>
+                    <a:lstStyle/>
+                    <a:p>
+                      <a:pPr algn="l" fontAlgn="b"/>
+                      <a:r>
+                        <a:rPr lang="en-US" sz="1100" b="0" i="0" u="none" strike="noStrike" dirty="0">
+                          <a:solidFill>
+                            <a:srgbClr val="000000"/>
+                          </a:solidFill>
+                          <a:effectLst/>
+                          <a:latin typeface="Calibri" panose="020F0502020204030204" pitchFamily="34" charset="0"/>
+                        </a:rPr>
+                        <a:t>ABM_run.1.5.23_A</a:t>
+                      </a:r>
+                    </a:p>
+                  </a:txBody>
+                  <a:tcPr marL="0" marR="0" marT="0" marB="0" anchor="b"/>
+                </a:tc>
+                <a:tc>
+                  <a:txBody>
+                    <a:bodyPr/>
+                    <a:lstStyle/>
+                    <a:p>
+                      <a:pPr algn="r" fontAlgn="b"/>
+                      <a:r>
+                        <a:rPr lang="en-US" sz="1100" b="0" i="0" u="none" strike="noStrike" dirty="0">
+                          <a:solidFill>
+                            <a:srgbClr val="7030A0"/>
+                          </a:solidFill>
+                          <a:effectLst/>
+                          <a:latin typeface="Calibri" panose="020F0502020204030204" pitchFamily="34" charset="0"/>
+                        </a:rPr>
+                        <a:t>300</a:t>
+                      </a:r>
+                    </a:p>
+                  </a:txBody>
+                  <a:tcPr marL="0" marR="0" marT="0" marB="0" anchor="b"/>
+                </a:tc>
+                <a:tc>
+                  <a:txBody>
+                    <a:bodyPr/>
+                    <a:lstStyle/>
+                    <a:p>
+                      <a:r>
+                        <a:rPr lang="en-US" sz="1100" dirty="0"/>
+                        <a:t>0</a:t>
+                      </a:r>
+                    </a:p>
+                  </a:txBody>
+                  <a:tcPr/>
+                </a:tc>
+                <a:tc>
+                  <a:txBody>
+                    <a:bodyPr/>
+                    <a:lstStyle/>
+                    <a:p>
+                      <a:pPr marL="0" marR="0" lvl="0" indent="0" algn="l" defTabSz="914400" rtl="0" eaLnBrk="1" fontAlgn="auto" latinLnBrk="0" hangingPunct="1">
+                        <a:lnSpc>
+                          <a:spcPct val="100000"/>
+                        </a:lnSpc>
+                        <a:spcBef>
+                          <a:spcPts val="0"/>
+                        </a:spcBef>
+                        <a:spcAft>
+                          <a:spcPts val="0"/>
+                        </a:spcAft>
+                        <a:buClrTx/>
+                        <a:buSzTx/>
+                        <a:buFontTx/>
+                        <a:buNone/>
+                        <a:tabLst/>
+                        <a:defRPr/>
+                      </a:pPr>
+                      <a:r>
+                        <a:rPr lang="en-US" sz="1100" dirty="0"/>
+                        <a:t>0.45</a:t>
+                      </a:r>
+                    </a:p>
+                  </a:txBody>
+                  <a:tcPr/>
+                </a:tc>
+                <a:tc>
+                  <a:txBody>
+                    <a:bodyPr/>
+                    <a:lstStyle/>
+                    <a:p>
+                      <a:pPr algn="r" fontAlgn="b"/>
+                      <a:r>
+                        <a:rPr lang="en-US" sz="1100" b="0" i="0" u="none" strike="noStrike" dirty="0">
+                          <a:solidFill>
+                            <a:srgbClr val="000000"/>
+                          </a:solidFill>
+                          <a:effectLst/>
+                          <a:latin typeface="Calibri" panose="020F0502020204030204" pitchFamily="34" charset="0"/>
+                        </a:rPr>
+                        <a:t>1</a:t>
+                      </a:r>
+                    </a:p>
+                  </a:txBody>
+                  <a:tcPr marL="0" marR="0" marT="0" marB="0" anchor="b"/>
+                </a:tc>
+                <a:tc>
+                  <a:txBody>
+                    <a:bodyPr/>
+                    <a:lstStyle/>
+                    <a:p>
+                      <a:r>
+                        <a:rPr lang="en-US" sz="1100" dirty="0"/>
+                        <a:t>9</a:t>
+                      </a:r>
+                    </a:p>
+                  </a:txBody>
+                  <a:tcPr/>
+                </a:tc>
+                <a:tc>
+                  <a:txBody>
+                    <a:bodyPr/>
+                    <a:lstStyle/>
+                    <a:p>
+                      <a:r>
+                        <a:rPr lang="en-US" sz="1100" dirty="0"/>
+                        <a:t>2</a:t>
+                      </a:r>
+                    </a:p>
+                  </a:txBody>
+                  <a:tcPr/>
+                </a:tc>
+                <a:extLst>
+                  <a:ext uri="{0D108BD9-81ED-4DB2-BD59-A6C34878D82A}">
+                    <a16:rowId xmlns:a16="http://schemas.microsoft.com/office/drawing/2014/main" val="4034882515"/>
+                  </a:ext>
+                </a:extLst>
+              </a:tr>
+            </a:tbl>
+          </a:graphicData>
+        </a:graphic>
+      </p:graphicFrame>
+    </p:spTree>
+    <p:extLst>
+      <p:ext uri="{BB962C8B-B14F-4D97-AF65-F5344CB8AC3E}">
+        <p14:creationId xmlns:p14="http://schemas.microsoft.com/office/powerpoint/2010/main" val="1718666261"/>
+      </p:ext>
+    </p:extLst>
+  </p:cSld>
+  <p:clrMapOvr>
+    <a:masterClrMapping/>
+  </p:clrMapOvr>
+</p:sld>
+</file>
+
+<file path=ppt/slides/slide23.xml><?xml version="1.0" encoding="utf-8"?>
+<p:sld xmlns:a="http://schemas.openxmlformats.org/drawingml/2006/main" xmlns:r="http://schemas.openxmlformats.org/officeDocument/2006/relationships" xmlns:p="http://schemas.openxmlformats.org/presentationml/2006/main">
+  <p:cSld>
+    <p:spTree>
+      <p:nvGrpSpPr>
+        <p:cNvPr id="1" name=""/>
+        <p:cNvGrpSpPr/>
+        <p:nvPr/>
+      </p:nvGrpSpPr>
+      <p:grpSpPr>
+        <a:xfrm>
+          <a:off x="0" y="0"/>
+          <a:ext cx="0" cy="0"/>
+          <a:chOff x="0" y="0"/>
+          <a:chExt cx="0" cy="0"/>
+        </a:xfrm>
+      </p:grpSpPr>
+      <p:sp>
+        <p:nvSpPr>
+          <p:cNvPr id="2" name="Title 1">
+            <a:extLst>
+              <a:ext uri="{FF2B5EF4-FFF2-40B4-BE49-F238E27FC236}">
+                <a16:creationId xmlns:a16="http://schemas.microsoft.com/office/drawing/2014/main" id="{4541B357-1BED-5B88-4B07-7558E7DE3EDF}"/>
+              </a:ext>
+            </a:extLst>
+          </p:cNvPr>
+          <p:cNvSpPr>
+            <a:spLocks noGrp="1"/>
+          </p:cNvSpPr>
+          <p:nvPr>
+            <p:ph type="title"/>
+          </p:nvPr>
+        </p:nvSpPr>
+        <p:spPr/>
+        <p:txBody>
+          <a:bodyPr/>
+          <a:lstStyle/>
+          <a:p>
+            <a:r>
+              <a:rPr lang="en-US" dirty="0"/>
+              <a:t>Conclusions</a:t>
+            </a:r>
+          </a:p>
+        </p:txBody>
+      </p:sp>
+      <p:sp>
+        <p:nvSpPr>
+          <p:cNvPr id="3" name="Content Placeholder 2">
+            <a:extLst>
+              <a:ext uri="{FF2B5EF4-FFF2-40B4-BE49-F238E27FC236}">
+                <a16:creationId xmlns:a16="http://schemas.microsoft.com/office/drawing/2014/main" id="{86D14108-4042-8CBE-543E-ABB4388565F5}"/>
+              </a:ext>
+            </a:extLst>
+          </p:cNvPr>
+          <p:cNvSpPr>
+            <a:spLocks noGrp="1"/>
+          </p:cNvSpPr>
+          <p:nvPr>
+            <p:ph idx="1"/>
+          </p:nvPr>
+        </p:nvSpPr>
+        <p:spPr/>
+        <p:txBody>
+          <a:bodyPr>
+            <a:normAutofit fontScale="92500" lnSpcReduction="10000"/>
+          </a:bodyPr>
+          <a:lstStyle/>
+          <a:p>
+            <a:r>
+              <a:rPr lang="en-US" b="1" dirty="0"/>
+              <a:t>1. Does the increase in genetic variants provided to a population via  migration provide a long term influence on individual and population fitness?</a:t>
+            </a:r>
+            <a:r>
+              <a:rPr lang="en-US" dirty="0"/>
+              <a:t> We hypothesized that extremely small populations will retain more of the migrant-related genetic variants than populations with more moderate population crashes due to the population growth potential in extremely small populations.</a:t>
+            </a:r>
+          </a:p>
+          <a:p>
+            <a:endParaRPr lang="en-US" dirty="0"/>
+          </a:p>
+          <a:p>
+            <a:r>
+              <a:rPr lang="en-US" dirty="0">
+                <a:solidFill>
+                  <a:srgbClr val="FF0000"/>
+                </a:solidFill>
+              </a:rPr>
+              <a:t>The proportion of migrant SNPs retained in the population was greater in smaller populations when there was one migrant per generation. Additionally, small populations diverged from the original population and lost heterozygosity at a faster rate than larger populations at all migration rates.</a:t>
+            </a:r>
+          </a:p>
+        </p:txBody>
+      </p:sp>
+    </p:spTree>
+    <p:extLst>
+      <p:ext uri="{BB962C8B-B14F-4D97-AF65-F5344CB8AC3E}">
+        <p14:creationId xmlns:p14="http://schemas.microsoft.com/office/powerpoint/2010/main" val="4080773754"/>
+      </p:ext>
+    </p:extLst>
+  </p:cSld>
+  <p:clrMapOvr>
+    <a:masterClrMapping/>
+  </p:clrMapOvr>
+</p:sld>
+</file>
+
+<file path=ppt/slides/slide24.xml><?xml version="1.0" encoding="utf-8"?>
+<p:sld xmlns:a="http://schemas.openxmlformats.org/drawingml/2006/main" xmlns:r="http://schemas.openxmlformats.org/officeDocument/2006/relationships" xmlns:p="http://schemas.openxmlformats.org/presentationml/2006/main">
+  <p:cSld>
+    <p:spTree>
+      <p:nvGrpSpPr>
+        <p:cNvPr id="1" name=""/>
+        <p:cNvGrpSpPr/>
+        <p:nvPr/>
+      </p:nvGrpSpPr>
+      <p:grpSpPr>
+        <a:xfrm>
+          <a:off x="0" y="0"/>
+          <a:ext cx="0" cy="0"/>
+          <a:chOff x="0" y="0"/>
+          <a:chExt cx="0" cy="0"/>
+        </a:xfrm>
+      </p:grpSpPr>
+      <p:sp>
+        <p:nvSpPr>
+          <p:cNvPr id="2" name="Title 1">
+            <a:extLst>
+              <a:ext uri="{FF2B5EF4-FFF2-40B4-BE49-F238E27FC236}">
+                <a16:creationId xmlns:a16="http://schemas.microsoft.com/office/drawing/2014/main" id="{4541B357-1BED-5B88-4B07-7558E7DE3EDF}"/>
+              </a:ext>
+            </a:extLst>
+          </p:cNvPr>
+          <p:cNvSpPr>
+            <a:spLocks noGrp="1"/>
+          </p:cNvSpPr>
+          <p:nvPr>
+            <p:ph type="title"/>
+          </p:nvPr>
+        </p:nvSpPr>
+        <p:spPr/>
+        <p:txBody>
+          <a:bodyPr/>
+          <a:lstStyle/>
+          <a:p>
+            <a:r>
+              <a:rPr lang="en-US" dirty="0"/>
+              <a:t>Conclusions</a:t>
+            </a:r>
+          </a:p>
+        </p:txBody>
+      </p:sp>
+      <p:sp>
+        <p:nvSpPr>
+          <p:cNvPr id="3" name="Content Placeholder 2">
+            <a:extLst>
+              <a:ext uri="{FF2B5EF4-FFF2-40B4-BE49-F238E27FC236}">
+                <a16:creationId xmlns:a16="http://schemas.microsoft.com/office/drawing/2014/main" id="{86D14108-4042-8CBE-543E-ABB4388565F5}"/>
+              </a:ext>
+            </a:extLst>
+          </p:cNvPr>
+          <p:cNvSpPr>
+            <a:spLocks noGrp="1"/>
+          </p:cNvSpPr>
+          <p:nvPr>
+            <p:ph idx="1"/>
+          </p:nvPr>
+        </p:nvSpPr>
+        <p:spPr/>
+        <p:txBody>
+          <a:bodyPr>
+            <a:normAutofit/>
+          </a:bodyPr>
+          <a:lstStyle/>
+          <a:p>
+            <a:r>
+              <a:rPr lang="en-US" b="1" dirty="0"/>
+              <a:t>2. Do migrants with particularly high fitness affect the receiving population’s long-term stability more so than migrants with moderate or low lifetime fitness? </a:t>
+            </a:r>
+            <a:r>
+              <a:rPr lang="en-US" dirty="0"/>
+              <a:t>We hypothesize that migrants with high fitness may result in more unstable populations long-term than migrants with lower fitness, since high fitness individuals may cause inbreeding to increase as offspring from high fitness individuals reproduce.</a:t>
+            </a:r>
+          </a:p>
+          <a:p>
+            <a:r>
+              <a:rPr lang="en-US" dirty="0">
+                <a:solidFill>
+                  <a:srgbClr val="FF0000"/>
+                </a:solidFill>
+              </a:rPr>
+              <a:t>LRS and RRS were higher in populations where migrants had a lower minor allele frequency (aka lower heterozygosity) with no change in inbreeding values.</a:t>
+            </a:r>
+          </a:p>
+        </p:txBody>
+      </p:sp>
+    </p:spTree>
+    <p:extLst>
+      <p:ext uri="{BB962C8B-B14F-4D97-AF65-F5344CB8AC3E}">
+        <p14:creationId xmlns:p14="http://schemas.microsoft.com/office/powerpoint/2010/main" val="3320240485"/>
+      </p:ext>
+    </p:extLst>
+  </p:cSld>
+  <p:clrMapOvr>
+    <a:masterClrMapping/>
+  </p:clrMapOvr>
+</p:sld>
+</file>
+
+<file path=ppt/slides/slide25.xml><?xml version="1.0" encoding="utf-8"?>
+<p:sld xmlns:a="http://schemas.openxmlformats.org/drawingml/2006/main" xmlns:r="http://schemas.openxmlformats.org/officeDocument/2006/relationships" xmlns:p="http://schemas.openxmlformats.org/presentationml/2006/main">
+  <p:cSld>
+    <p:spTree>
+      <p:nvGrpSpPr>
+        <p:cNvPr id="1" name=""/>
+        <p:cNvGrpSpPr/>
+        <p:nvPr/>
+      </p:nvGrpSpPr>
+      <p:grpSpPr>
+        <a:xfrm>
+          <a:off x="0" y="0"/>
+          <a:ext cx="0" cy="0"/>
+          <a:chOff x="0" y="0"/>
+          <a:chExt cx="0" cy="0"/>
+        </a:xfrm>
+      </p:grpSpPr>
+      <p:sp>
+        <p:nvSpPr>
+          <p:cNvPr id="2" name="Title 1">
+            <a:extLst>
+              <a:ext uri="{FF2B5EF4-FFF2-40B4-BE49-F238E27FC236}">
                 <a16:creationId xmlns:a16="http://schemas.microsoft.com/office/drawing/2014/main" id="{4541B357-1BED-5B88-4B07-7558E7DE3EDF}"/>
               </a:ext>
             </a:extLst>
@@ -7341,7 +11404,7 @@
 </p:sld>
 </file>
 
-<file path=ppt/slides/slide22.xml><?xml version="1.0" encoding="utf-8"?>
+<file path=ppt/slides/slide26.xml><?xml version="1.0" encoding="utf-8"?>
 <p:sld xmlns:a="http://schemas.openxmlformats.org/drawingml/2006/main" xmlns:r="http://schemas.openxmlformats.org/officeDocument/2006/relationships" xmlns:p="http://schemas.openxmlformats.org/presentationml/2006/main">
   <p:cSld>
     <p:spTree>

</xml_diff>